<commit_message>
all the functions are done
</commit_message>
<xml_diff>
--- a/LudoPPT.pptx
+++ b/LudoPPT.pptx
@@ -8,10 +8,10 @@
     <p:sldId id="256" r:id="rId2"/>
     <p:sldId id="257" r:id="rId3"/>
     <p:sldId id="258" r:id="rId4"/>
-    <p:sldId id="264" r:id="rId5"/>
-    <p:sldId id="261" r:id="rId6"/>
-    <p:sldId id="262" r:id="rId7"/>
-    <p:sldId id="263" r:id="rId8"/>
+    <p:sldId id="259" r:id="rId5"/>
+    <p:sldId id="260" r:id="rId6"/>
+    <p:sldId id="261" r:id="rId7"/>
+    <p:sldId id="262" r:id="rId8"/>
   </p:sldIdLst>
   <p:sldSz cx="12192000" cy="6858000"/>
   <p:notesSz cx="6858000" cy="9144000"/>
@@ -122,8 +122,10 @@
 <p1510:revInfo xmlns:a="http://schemas.openxmlformats.org/drawingml/2006/main" xmlns:r="http://schemas.openxmlformats.org/officeDocument/2006/relationships" xmlns:p1510="http://schemas.microsoft.com/office/powerpoint/2015/10/main">
   <p1510:revLst>
     <p1510:client id="{00000000-0000-0000-0000-000000000000}" v="23" dt="2021-03-31T06:03:14.264"/>
+    <p1510:client id="{1DAC17B0-8D08-4D86-0E50-488555473BEC}" v="506" dt="2021-04-20T18:46:22.744"/>
     <p1510:client id="{2B866B02-1C0B-0369-2111-F5E262C5B2EC}" v="66" dt="2021-03-10T06:23:50.214"/>
     <p1510:client id="{9927B766-562A-FD47-E608-0E706318D6B4}" v="1" dt="2021-03-31T06:08:05.736"/>
+    <p1510:client id="{B022C09F-60F8-0000-936A-7033B7F3B4E4}" v="267" dt="2021-04-20T16:08:32.608"/>
     <p1510:client id="{B08DB99F-0078-0000-8957-156DC631B098}" v="1592" dt="2021-03-31T05:55:42.646"/>
     <p1510:client id="{C3E1BD3F-785C-4011-A359-035B7F86650D}" v="418" dt="2021-03-09T17:04:23.887"/>
   </p1510:revLst>
@@ -259,7 +261,7 @@
           <a:p>
             <a:fld id="{846CE7D5-CF57-46EF-B807-FDD0502418D4}" type="datetimeFigureOut">
               <a:rPr lang="en-US" smtClean="0"/>
-              <a:t>4/11/2021</a:t>
+              <a:t>4/20/2021</a:t>
             </a:fld>
             <a:endParaRPr lang="en-US"/>
           </a:p>
@@ -427,7 +429,7 @@
           <a:p>
             <a:fld id="{846CE7D5-CF57-46EF-B807-FDD0502418D4}" type="datetimeFigureOut">
               <a:rPr lang="en-US" smtClean="0"/>
-              <a:t>4/11/2021</a:t>
+              <a:t>4/20/2021</a:t>
             </a:fld>
             <a:endParaRPr lang="en-US"/>
           </a:p>
@@ -605,7 +607,7 @@
           <a:p>
             <a:fld id="{846CE7D5-CF57-46EF-B807-FDD0502418D4}" type="datetimeFigureOut">
               <a:rPr lang="en-US" smtClean="0"/>
-              <a:t>4/11/2021</a:t>
+              <a:t>4/20/2021</a:t>
             </a:fld>
             <a:endParaRPr lang="en-US"/>
           </a:p>
@@ -773,7 +775,7 @@
           <a:p>
             <a:fld id="{846CE7D5-CF57-46EF-B807-FDD0502418D4}" type="datetimeFigureOut">
               <a:rPr lang="en-US" smtClean="0"/>
-              <a:t>4/11/2021</a:t>
+              <a:t>4/20/2021</a:t>
             </a:fld>
             <a:endParaRPr lang="en-US"/>
           </a:p>
@@ -1018,7 +1020,7 @@
           <a:p>
             <a:fld id="{846CE7D5-CF57-46EF-B807-FDD0502418D4}" type="datetimeFigureOut">
               <a:rPr lang="en-US" smtClean="0"/>
-              <a:t>4/11/2021</a:t>
+              <a:t>4/20/2021</a:t>
             </a:fld>
             <a:endParaRPr lang="en-US"/>
           </a:p>
@@ -1247,7 +1249,7 @@
           <a:p>
             <a:fld id="{846CE7D5-CF57-46EF-B807-FDD0502418D4}" type="datetimeFigureOut">
               <a:rPr lang="en-US" smtClean="0"/>
-              <a:t>4/11/2021</a:t>
+              <a:t>4/20/2021</a:t>
             </a:fld>
             <a:endParaRPr lang="en-US"/>
           </a:p>
@@ -1611,7 +1613,7 @@
           <a:p>
             <a:fld id="{846CE7D5-CF57-46EF-B807-FDD0502418D4}" type="datetimeFigureOut">
               <a:rPr lang="en-US" smtClean="0"/>
-              <a:t>4/11/2021</a:t>
+              <a:t>4/20/2021</a:t>
             </a:fld>
             <a:endParaRPr lang="en-US"/>
           </a:p>
@@ -1728,7 +1730,7 @@
           <a:p>
             <a:fld id="{846CE7D5-CF57-46EF-B807-FDD0502418D4}" type="datetimeFigureOut">
               <a:rPr lang="en-US" smtClean="0"/>
-              <a:t>4/11/2021</a:t>
+              <a:t>4/20/2021</a:t>
             </a:fld>
             <a:endParaRPr lang="en-US"/>
           </a:p>
@@ -1823,7 +1825,7 @@
           <a:p>
             <a:fld id="{846CE7D5-CF57-46EF-B807-FDD0502418D4}" type="datetimeFigureOut">
               <a:rPr lang="en-US" smtClean="0"/>
-              <a:t>4/11/2021</a:t>
+              <a:t>4/20/2021</a:t>
             </a:fld>
             <a:endParaRPr lang="en-US"/>
           </a:p>
@@ -2098,7 +2100,7 @@
           <a:p>
             <a:fld id="{846CE7D5-CF57-46EF-B807-FDD0502418D4}" type="datetimeFigureOut">
               <a:rPr lang="en-US" smtClean="0"/>
-              <a:t>4/11/2021</a:t>
+              <a:t>4/20/2021</a:t>
             </a:fld>
             <a:endParaRPr lang="en-US"/>
           </a:p>
@@ -2353,7 +2355,7 @@
           <a:p>
             <a:fld id="{846CE7D5-CF57-46EF-B807-FDD0502418D4}" type="datetimeFigureOut">
               <a:rPr lang="en-US" smtClean="0"/>
-              <a:t>4/11/2021</a:t>
+              <a:t>4/20/2021</a:t>
             </a:fld>
             <a:endParaRPr lang="en-US"/>
           </a:p>
@@ -2564,7 +2566,7 @@
           <a:p>
             <a:fld id="{846CE7D5-CF57-46EF-B807-FDD0502418D4}" type="datetimeFigureOut">
               <a:rPr lang="en-US" smtClean="0"/>
-              <a:t>4/11/2021</a:t>
+              <a:t>4/20/2021</a:t>
             </a:fld>
             <a:endParaRPr lang="en-US"/>
           </a:p>
@@ -3925,7 +3927,7 @@
           <a:lstStyle/>
           <a:p>
             <a:r>
-              <a:rPr lang="en-US">
+              <a:rPr lang="en-US" b="1" dirty="0">
                 <a:solidFill>
                   <a:srgbClr val="FFFFFF"/>
                 </a:solidFill>
@@ -3933,7 +3935,7 @@
               </a:rPr>
               <a:t>Phases</a:t>
             </a:r>
-            <a:endParaRPr lang="en-US">
+            <a:endParaRPr lang="en-US" b="1" dirty="0">
               <a:solidFill>
                 <a:srgbClr val="FFFFFF"/>
               </a:solidFill>
@@ -4025,6 +4027,1070 @@
 </file>
 
 <file path=ppt/slides/slide4.xml><?xml version="1.0" encoding="utf-8"?>
+<p:sld xmlns:a="http://schemas.openxmlformats.org/drawingml/2006/main" xmlns:r="http://schemas.openxmlformats.org/officeDocument/2006/relationships" xmlns:p="http://schemas.openxmlformats.org/presentationml/2006/main">
+  <p:cSld>
+    <p:bg>
+      <p:bgPr>
+        <a:solidFill>
+          <a:schemeClr val="accent5">
+            <a:lumMod val="50000"/>
+          </a:schemeClr>
+        </a:solidFill>
+        <a:effectLst/>
+      </p:bgPr>
+    </p:bg>
+    <p:spTree>
+      <p:nvGrpSpPr>
+        <p:cNvPr id="1" name=""/>
+        <p:cNvGrpSpPr/>
+        <p:nvPr/>
+      </p:nvGrpSpPr>
+      <p:grpSpPr>
+        <a:xfrm>
+          <a:off x="0" y="0"/>
+          <a:ext cx="0" cy="0"/>
+          <a:chOff x="0" y="0"/>
+          <a:chExt cx="0" cy="0"/>
+        </a:xfrm>
+      </p:grpSpPr>
+      <p:sp>
+        <p:nvSpPr>
+          <p:cNvPr id="9" name="Rectangle 8">
+            <a:extLst>
+              <a:ext uri="{FF2B5EF4-FFF2-40B4-BE49-F238E27FC236}">
+                <a16:creationId xmlns:a16="http://schemas.microsoft.com/office/drawing/2014/main" id="{2A6B319F-86FE-4754-878E-06F0804D882B}"/>
+              </a:ext>
+              <a:ext uri="{C183D7F6-B498-43B3-948B-1728B52AA6E4}">
+                <adec:decorative xmlns:adec="http://schemas.microsoft.com/office/drawing/2017/decorative" val="1"/>
+              </a:ext>
+            </a:extLst>
+          </p:cNvPr>
+          <p:cNvSpPr>
+            <a:spLocks noGrp="1" noRot="1" noChangeAspect="1" noMove="1" noResize="1" noEditPoints="1" noAdjustHandles="1" noChangeArrowheads="1" noChangeShapeType="1" noTextEdit="1"/>
+          </p:cNvSpPr>
+          <p:nvPr>
+            <p:extLst>
+              <p:ext uri="{386F3935-93C4-4BCD-93E2-E3B085C9AB24}">
+                <p16:designElem xmlns:p16="http://schemas.microsoft.com/office/powerpoint/2015/main" val="1"/>
+              </p:ext>
+            </p:extLst>
+          </p:nvPr>
+        </p:nvSpPr>
+        <p:spPr>
+          <a:xfrm>
+            <a:off x="0" y="0"/>
+            <a:ext cx="832385" cy="6858000"/>
+          </a:xfrm>
+          <a:prstGeom prst="rect">
+            <a:avLst/>
+          </a:prstGeom>
+          <a:solidFill>
+            <a:schemeClr val="accent5">
+              <a:alpha val="70000"/>
+            </a:schemeClr>
+          </a:solidFill>
+          <a:ln>
+            <a:noFill/>
+          </a:ln>
+        </p:spPr>
+        <p:style>
+          <a:lnRef idx="2">
+            <a:schemeClr val="accent1">
+              <a:shade val="50000"/>
+            </a:schemeClr>
+          </a:lnRef>
+          <a:fillRef idx="1003">
+            <a:schemeClr val="lt1"/>
+          </a:fillRef>
+          <a:effectRef idx="0">
+            <a:schemeClr val="accent1"/>
+          </a:effectRef>
+          <a:fontRef idx="minor">
+            <a:schemeClr val="lt1"/>
+          </a:fontRef>
+        </p:style>
+        <p:txBody>
+          <a:bodyPr rtlCol="0" anchor="ctr"/>
+          <a:lstStyle/>
+          <a:p>
+            <a:pPr algn="ctr"/>
+            <a:endParaRPr lang="en-US">
+              <a:solidFill>
+                <a:schemeClr val="accent2"/>
+              </a:solidFill>
+            </a:endParaRPr>
+          </a:p>
+        </p:txBody>
+      </p:sp>
+      <p:sp>
+        <p:nvSpPr>
+          <p:cNvPr id="11" name="Rectangle 10">
+            <a:extLst>
+              <a:ext uri="{FF2B5EF4-FFF2-40B4-BE49-F238E27FC236}">
+                <a16:creationId xmlns:a16="http://schemas.microsoft.com/office/drawing/2014/main" id="{DCF7D1B5-3477-499F-ACC5-2C8B07F4EDB3}"/>
+              </a:ext>
+              <a:ext uri="{C183D7F6-B498-43B3-948B-1728B52AA6E4}">
+                <adec:decorative xmlns:adec="http://schemas.microsoft.com/office/drawing/2017/decorative" val="1"/>
+              </a:ext>
+            </a:extLst>
+          </p:cNvPr>
+          <p:cNvSpPr>
+            <a:spLocks noGrp="1" noRot="1" noChangeAspect="1" noMove="1" noResize="1" noEditPoints="1" noAdjustHandles="1" noChangeArrowheads="1" noChangeShapeType="1" noTextEdit="1"/>
+          </p:cNvSpPr>
+          <p:nvPr>
+            <p:extLst>
+              <p:ext uri="{386F3935-93C4-4BCD-93E2-E3B085C9AB24}">
+                <p16:designElem xmlns:p16="http://schemas.microsoft.com/office/powerpoint/2015/main" val="1"/>
+              </p:ext>
+            </p:extLst>
+          </p:nvPr>
+        </p:nvSpPr>
+        <p:spPr>
+          <a:xfrm>
+            <a:off x="832385" y="0"/>
+            <a:ext cx="3218914" cy="6858000"/>
+          </a:xfrm>
+          <a:prstGeom prst="rect">
+            <a:avLst/>
+          </a:prstGeom>
+          <a:solidFill>
+            <a:schemeClr val="accent5">
+              <a:lumMod val="75000"/>
+              <a:alpha val="80000"/>
+            </a:schemeClr>
+          </a:solidFill>
+          <a:ln>
+            <a:noFill/>
+          </a:ln>
+        </p:spPr>
+        <p:style>
+          <a:lnRef idx="2">
+            <a:schemeClr val="accent1">
+              <a:shade val="50000"/>
+            </a:schemeClr>
+          </a:lnRef>
+          <a:fillRef idx="1">
+            <a:schemeClr val="accent1"/>
+          </a:fillRef>
+          <a:effectRef idx="0">
+            <a:schemeClr val="accent1"/>
+          </a:effectRef>
+          <a:fontRef idx="minor">
+            <a:schemeClr val="lt1"/>
+          </a:fontRef>
+        </p:style>
+        <p:txBody>
+          <a:bodyPr rtlCol="0" anchor="ctr"/>
+          <a:lstStyle/>
+          <a:p>
+            <a:pPr algn="ctr"/>
+            <a:endParaRPr lang="en-US"/>
+          </a:p>
+        </p:txBody>
+      </p:sp>
+      <p:sp>
+        <p:nvSpPr>
+          <p:cNvPr id="2" name="Title 1">
+            <a:extLst>
+              <a:ext uri="{FF2B5EF4-FFF2-40B4-BE49-F238E27FC236}">
+                <a16:creationId xmlns:a16="http://schemas.microsoft.com/office/drawing/2014/main" id="{235020B8-855B-4DD1-A210-0E892D104341}"/>
+              </a:ext>
+            </a:extLst>
+          </p:cNvPr>
+          <p:cNvSpPr>
+            <a:spLocks noGrp="1"/>
+          </p:cNvSpPr>
+          <p:nvPr>
+            <p:ph type="title"/>
+          </p:nvPr>
+        </p:nvSpPr>
+        <p:spPr>
+          <a:xfrm>
+            <a:off x="992206" y="1608667"/>
+            <a:ext cx="2823275" cy="4501127"/>
+          </a:xfrm>
+        </p:spPr>
+        <p:txBody>
+          <a:bodyPr vert="horz" lIns="91440" tIns="45720" rIns="91440" bIns="45720" rtlCol="0" anchor="ctr">
+            <a:normAutofit/>
+          </a:bodyPr>
+          <a:lstStyle/>
+          <a:p>
+            <a:pPr algn="r"/>
+            <a:r>
+              <a:rPr lang="en-US" sz="3200" b="1" kern="1200">
+                <a:solidFill>
+                  <a:srgbClr val="FFFFFF"/>
+                </a:solidFill>
+                <a:latin typeface="+mj-lt"/>
+                <a:ea typeface="+mj-ea"/>
+                <a:cs typeface="+mj-cs"/>
+              </a:rPr>
+              <a:t>Structures Used</a:t>
+            </a:r>
+            <a:endParaRPr lang="en-US" sz="3200" b="1" kern="1200">
+              <a:solidFill>
+                <a:srgbClr val="FFFFFF"/>
+              </a:solidFill>
+              <a:latin typeface="+mj-lt"/>
+              <a:cs typeface="Calibri Light"/>
+            </a:endParaRPr>
+          </a:p>
+        </p:txBody>
+      </p:sp>
+      <p:sp>
+        <p:nvSpPr>
+          <p:cNvPr id="3" name="Content Placeholder 2">
+            <a:extLst>
+              <a:ext uri="{FF2B5EF4-FFF2-40B4-BE49-F238E27FC236}">
+                <a16:creationId xmlns:a16="http://schemas.microsoft.com/office/drawing/2014/main" id="{69979228-463F-4DFD-8186-CD5046053D17}"/>
+              </a:ext>
+            </a:extLst>
+          </p:cNvPr>
+          <p:cNvSpPr>
+            <a:spLocks noGrp="1"/>
+          </p:cNvSpPr>
+          <p:nvPr>
+            <p:ph idx="1"/>
+          </p:nvPr>
+        </p:nvSpPr>
+        <p:spPr>
+          <a:xfrm>
+            <a:off x="4547698" y="1608667"/>
+            <a:ext cx="3421958" cy="4501127"/>
+          </a:xfrm>
+        </p:spPr>
+        <p:txBody>
+          <a:bodyPr vert="horz" lIns="91440" tIns="45720" rIns="91440" bIns="45720" rtlCol="0" anchor="t">
+            <a:normAutofit/>
+          </a:bodyPr>
+          <a:lstStyle/>
+          <a:p>
+            <a:pPr marL="0" indent="0">
+              <a:buNone/>
+            </a:pPr>
+            <a:r>
+              <a:rPr lang="en-US" sz="2000"/>
+              <a:t>struct pawns</a:t>
+            </a:r>
+            <a:endParaRPr lang="en-US"/>
+          </a:p>
+          <a:p>
+            <a:pPr marL="0" indent="0">
+              <a:buNone/>
+            </a:pPr>
+            <a:r>
+              <a:rPr lang="en-US" sz="2000"/>
+              <a:t>{</a:t>
+            </a:r>
+            <a:endParaRPr lang="en-US">
+              <a:cs typeface="Calibri"/>
+            </a:endParaRPr>
+          </a:p>
+          <a:p>
+            <a:pPr marL="0" indent="0">
+              <a:buNone/>
+            </a:pPr>
+            <a:r>
+              <a:rPr lang="en-US" sz="2000"/>
+              <a:t>    int pos;</a:t>
+            </a:r>
+            <a:endParaRPr lang="en-US" sz="2000">
+              <a:cs typeface="Calibri" panose="020F0502020204030204"/>
+            </a:endParaRPr>
+          </a:p>
+          <a:p>
+            <a:pPr marL="0" indent="0">
+              <a:buNone/>
+            </a:pPr>
+            <a:r>
+              <a:rPr lang="en-US" sz="2000"/>
+              <a:t>    int status;</a:t>
+            </a:r>
+            <a:endParaRPr lang="en-US" sz="2000">
+              <a:cs typeface="Calibri" panose="020F0502020204030204"/>
+            </a:endParaRPr>
+          </a:p>
+          <a:p>
+            <a:pPr marL="0" indent="0">
+              <a:buNone/>
+            </a:pPr>
+            <a:r>
+              <a:rPr lang="en-US" sz="2000"/>
+              <a:t>    int sum;</a:t>
+            </a:r>
+            <a:endParaRPr lang="en-US" sz="2000">
+              <a:cs typeface="Calibri" panose="020F0502020204030204"/>
+            </a:endParaRPr>
+          </a:p>
+          <a:p>
+            <a:pPr marL="0" indent="0">
+              <a:buNone/>
+            </a:pPr>
+            <a:r>
+              <a:rPr lang="en-US" sz="2000"/>
+              <a:t>}</a:t>
+            </a:r>
+            <a:endParaRPr lang="en-US" sz="2000">
+              <a:cs typeface="Calibri" panose="020F0502020204030204"/>
+            </a:endParaRPr>
+          </a:p>
+          <a:p>
+            <a:r>
+              <a:rPr lang="en-US" sz="2000"/>
+              <a:t>pos: To store the position of pawn</a:t>
+            </a:r>
+            <a:endParaRPr lang="en-US" sz="2000">
+              <a:cs typeface="Calibri" panose="020F0502020204030204"/>
+            </a:endParaRPr>
+          </a:p>
+          <a:p>
+            <a:r>
+              <a:rPr lang="en-US" sz="2000"/>
+              <a:t>status : To check the pawn is in home or not</a:t>
+            </a:r>
+            <a:endParaRPr lang="en-US" sz="2000">
+              <a:cs typeface="Calibri" panose="020F0502020204030204"/>
+            </a:endParaRPr>
+          </a:p>
+          <a:p>
+            <a:r>
+              <a:rPr lang="en-US" sz="2000"/>
+              <a:t>sum : Count steps of pawn</a:t>
+            </a:r>
+            <a:endParaRPr lang="en-US" sz="2000">
+              <a:cs typeface="Calibri" panose="020F0502020204030204"/>
+            </a:endParaRPr>
+          </a:p>
+        </p:txBody>
+      </p:sp>
+      <p:sp>
+        <p:nvSpPr>
+          <p:cNvPr id="4" name="TextBox 3">
+            <a:extLst>
+              <a:ext uri="{FF2B5EF4-FFF2-40B4-BE49-F238E27FC236}">
+                <a16:creationId xmlns:a16="http://schemas.microsoft.com/office/drawing/2014/main" id="{FE6A3689-24C8-45BA-AEE7-D932F90CA15D}"/>
+              </a:ext>
+            </a:extLst>
+          </p:cNvPr>
+          <p:cNvSpPr txBox="1"/>
+          <p:nvPr/>
+        </p:nvSpPr>
+        <p:spPr>
+          <a:xfrm>
+            <a:off x="8289696" y="1608667"/>
+            <a:ext cx="3421957" cy="4501127"/>
+          </a:xfrm>
+          <a:prstGeom prst="rect">
+            <a:avLst/>
+          </a:prstGeom>
+        </p:spPr>
+        <p:txBody>
+          <a:bodyPr rot="0" spcFirstLastPara="0" vertOverflow="overflow" horzOverflow="overflow" vert="horz" lIns="91440" tIns="45720" rIns="91440" bIns="45720" numCol="1" spcCol="0" rtlCol="0" fromWordArt="0" anchor="t" anchorCtr="0" forceAA="0" compatLnSpc="1">
+            <a:prstTxWarp prst="textNoShape">
+              <a:avLst/>
+            </a:prstTxWarp>
+            <a:normAutofit lnSpcReduction="10000"/>
+          </a:bodyPr>
+          <a:lstStyle/>
+          <a:p>
+            <a:pPr>
+              <a:lnSpc>
+                <a:spcPct val="90000"/>
+              </a:lnSpc>
+              <a:spcAft>
+                <a:spcPts val="600"/>
+              </a:spcAft>
+            </a:pPr>
+            <a:r>
+              <a:rPr lang="en-US" sz="1900"/>
+              <a:t>struct user</a:t>
+            </a:r>
+            <a:endParaRPr lang="en-US">
+              <a:cs typeface="Calibri" panose="020F0502020204030204"/>
+            </a:endParaRPr>
+          </a:p>
+          <a:p>
+            <a:pPr>
+              <a:lnSpc>
+                <a:spcPct val="90000"/>
+              </a:lnSpc>
+              <a:spcAft>
+                <a:spcPts val="600"/>
+              </a:spcAft>
+            </a:pPr>
+            <a:r>
+              <a:rPr lang="en-US" sz="1900"/>
+              <a:t>{</a:t>
+            </a:r>
+            <a:endParaRPr lang="en-US" sz="1900">
+              <a:cs typeface="Calibri" panose="020F0502020204030204"/>
+            </a:endParaRPr>
+          </a:p>
+          <a:p>
+            <a:pPr>
+              <a:lnSpc>
+                <a:spcPct val="90000"/>
+              </a:lnSpc>
+              <a:spcAft>
+                <a:spcPts val="600"/>
+              </a:spcAft>
+            </a:pPr>
+            <a:r>
+              <a:rPr lang="en-US" sz="1900" dirty="0"/>
+              <a:t>    </a:t>
+            </a:r>
+            <a:r>
+              <a:rPr lang="en-US" sz="1900"/>
+              <a:t>struct pawns g[4];</a:t>
+            </a:r>
+            <a:endParaRPr lang="en-US" sz="1900">
+              <a:cs typeface="Calibri" panose="020F0502020204030204"/>
+            </a:endParaRPr>
+          </a:p>
+          <a:p>
+            <a:pPr>
+              <a:lnSpc>
+                <a:spcPct val="90000"/>
+              </a:lnSpc>
+              <a:spcAft>
+                <a:spcPts val="600"/>
+              </a:spcAft>
+            </a:pPr>
+            <a:r>
+              <a:rPr lang="en-US" sz="1900" dirty="0"/>
+              <a:t>    </a:t>
+            </a:r>
+            <a:r>
+              <a:rPr lang="en-US" sz="1900"/>
+              <a:t>int def;</a:t>
+            </a:r>
+            <a:endParaRPr lang="en-US" sz="1900">
+              <a:cs typeface="Calibri" panose="020F0502020204030204"/>
+            </a:endParaRPr>
+          </a:p>
+          <a:p>
+            <a:pPr>
+              <a:lnSpc>
+                <a:spcPct val="90000"/>
+              </a:lnSpc>
+              <a:spcAft>
+                <a:spcPts val="600"/>
+              </a:spcAft>
+            </a:pPr>
+            <a:r>
+              <a:rPr lang="en-US" sz="1900" dirty="0"/>
+              <a:t>     </a:t>
+            </a:r>
+            <a:r>
+              <a:rPr lang="en-US" sz="1900"/>
+              <a:t>int color;</a:t>
+            </a:r>
+            <a:endParaRPr lang="en-US" sz="1900">
+              <a:cs typeface="Calibri" panose="020F0502020204030204"/>
+            </a:endParaRPr>
+          </a:p>
+          <a:p>
+            <a:pPr>
+              <a:lnSpc>
+                <a:spcPct val="90000"/>
+              </a:lnSpc>
+              <a:spcAft>
+                <a:spcPts val="600"/>
+              </a:spcAft>
+            </a:pPr>
+            <a:r>
+              <a:rPr lang="en-US" sz="1900" dirty="0"/>
+              <a:t>     </a:t>
+            </a:r>
+            <a:r>
+              <a:rPr lang="en-US" sz="1900"/>
+              <a:t>int win;</a:t>
+            </a:r>
+            <a:endParaRPr lang="en-US" sz="1900">
+              <a:cs typeface="Calibri" panose="020F0502020204030204"/>
+            </a:endParaRPr>
+          </a:p>
+          <a:p>
+            <a:pPr>
+              <a:lnSpc>
+                <a:spcPct val="90000"/>
+              </a:lnSpc>
+              <a:spcAft>
+                <a:spcPts val="600"/>
+              </a:spcAft>
+            </a:pPr>
+            <a:r>
+              <a:rPr lang="en-US" sz="1900"/>
+              <a:t>}</a:t>
+            </a:r>
+            <a:endParaRPr lang="en-US" sz="1900">
+              <a:cs typeface="Calibri" panose="020F0502020204030204"/>
+            </a:endParaRPr>
+          </a:p>
+          <a:p>
+            <a:pPr>
+              <a:lnSpc>
+                <a:spcPct val="90000"/>
+              </a:lnSpc>
+              <a:spcAft>
+                <a:spcPts val="600"/>
+              </a:spcAft>
+            </a:pPr>
+            <a:endParaRPr lang="en-US" sz="1900">
+              <a:cs typeface="Calibri" panose="020F0502020204030204"/>
+            </a:endParaRPr>
+          </a:p>
+          <a:p>
+            <a:pPr marL="342900" indent="-342900">
+              <a:lnSpc>
+                <a:spcPct val="90000"/>
+              </a:lnSpc>
+              <a:spcAft>
+                <a:spcPts val="600"/>
+              </a:spcAft>
+              <a:buFont typeface="Arial"/>
+              <a:buChar char="•"/>
+            </a:pPr>
+            <a:r>
+              <a:rPr lang="en-US" sz="1900"/>
+              <a:t>g[4] : Create 4 pawns</a:t>
+            </a:r>
+            <a:endParaRPr lang="en-US" sz="1900">
+              <a:cs typeface="Calibri" panose="020F0502020204030204"/>
+            </a:endParaRPr>
+          </a:p>
+          <a:p>
+            <a:pPr marL="342900" indent="-342900">
+              <a:lnSpc>
+                <a:spcPct val="90000"/>
+              </a:lnSpc>
+              <a:spcAft>
+                <a:spcPts val="600"/>
+              </a:spcAft>
+              <a:buFont typeface="Arial"/>
+              <a:buChar char="•"/>
+            </a:pPr>
+            <a:r>
+              <a:rPr lang="en-US" sz="1900"/>
+              <a:t>def : Starting position</a:t>
+            </a:r>
+            <a:endParaRPr lang="en-US" sz="1900">
+              <a:cs typeface="Calibri" panose="020F0502020204030204"/>
+            </a:endParaRPr>
+          </a:p>
+          <a:p>
+            <a:pPr marL="342900" indent="-342900">
+              <a:lnSpc>
+                <a:spcPct val="90000"/>
+              </a:lnSpc>
+              <a:spcAft>
+                <a:spcPts val="600"/>
+              </a:spcAft>
+              <a:buFont typeface="Arial"/>
+              <a:buChar char="•"/>
+            </a:pPr>
+            <a:r>
+              <a:rPr lang="en-US" sz="1900"/>
+              <a:t>Color : To store color of pawns</a:t>
+            </a:r>
+            <a:endParaRPr lang="en-US" sz="1900">
+              <a:cs typeface="Calibri" panose="020F0502020204030204"/>
+            </a:endParaRPr>
+          </a:p>
+          <a:p>
+            <a:pPr marL="342900" indent="-342900">
+              <a:lnSpc>
+                <a:spcPct val="90000"/>
+              </a:lnSpc>
+              <a:spcAft>
+                <a:spcPts val="600"/>
+              </a:spcAft>
+              <a:buFont typeface="Arial"/>
+              <a:buChar char="•"/>
+            </a:pPr>
+            <a:r>
+              <a:rPr lang="en-US" sz="1900"/>
+              <a:t>win: Indicates number of pawns in home</a:t>
+            </a:r>
+            <a:endParaRPr lang="en-US" sz="1900">
+              <a:cs typeface="Calibri" panose="020F0502020204030204"/>
+            </a:endParaRPr>
+          </a:p>
+        </p:txBody>
+      </p:sp>
+    </p:spTree>
+    <p:extLst>
+      <p:ext uri="{BB962C8B-B14F-4D97-AF65-F5344CB8AC3E}">
+        <p14:creationId xmlns:p14="http://schemas.microsoft.com/office/powerpoint/2010/main" val="4159897172"/>
+      </p:ext>
+    </p:extLst>
+  </p:cSld>
+  <p:clrMapOvr>
+    <a:overrideClrMapping bg1="dk1" tx1="lt1" bg2="dk2" tx2="lt2" accent1="accent1" accent2="accent2" accent3="accent3" accent4="accent4" accent5="accent5" accent6="accent6" hlink="hlink" folHlink="folHlink"/>
+  </p:clrMapOvr>
+</p:sld>
+</file>
+
+<file path=ppt/slides/slide5.xml><?xml version="1.0" encoding="utf-8"?>
+<p:sld xmlns:a="http://schemas.openxmlformats.org/drawingml/2006/main" xmlns:r="http://schemas.openxmlformats.org/officeDocument/2006/relationships" xmlns:p="http://schemas.openxmlformats.org/presentationml/2006/main">
+  <p:cSld>
+    <p:bg>
+      <p:bgPr>
+        <a:solidFill>
+          <a:schemeClr val="bg1"/>
+        </a:solidFill>
+        <a:effectLst/>
+      </p:bgPr>
+    </p:bg>
+    <p:spTree>
+      <p:nvGrpSpPr>
+        <p:cNvPr id="1" name=""/>
+        <p:cNvGrpSpPr/>
+        <p:nvPr/>
+      </p:nvGrpSpPr>
+      <p:grpSpPr>
+        <a:xfrm>
+          <a:off x="0" y="0"/>
+          <a:ext cx="0" cy="0"/>
+          <a:chOff x="0" y="0"/>
+          <a:chExt cx="0" cy="0"/>
+        </a:xfrm>
+      </p:grpSpPr>
+      <p:sp>
+        <p:nvSpPr>
+          <p:cNvPr id="9" name="Rectangle 8">
+            <a:extLst>
+              <a:ext uri="{FF2B5EF4-FFF2-40B4-BE49-F238E27FC236}">
+                <a16:creationId xmlns:a16="http://schemas.microsoft.com/office/drawing/2014/main" id="{B538A7B5-B32D-421E-B110-AB5B1A7CC2E8}"/>
+              </a:ext>
+              <a:ext uri="{C183D7F6-B498-43B3-948B-1728B52AA6E4}">
+                <adec:decorative xmlns:adec="http://schemas.microsoft.com/office/drawing/2017/decorative" val="1"/>
+              </a:ext>
+            </a:extLst>
+          </p:cNvPr>
+          <p:cNvSpPr>
+            <a:spLocks noGrp="1" noRot="1" noChangeAspect="1" noMove="1" noResize="1" noEditPoints="1" noAdjustHandles="1" noChangeArrowheads="1" noChangeShapeType="1" noTextEdit="1"/>
+          </p:cNvSpPr>
+          <p:nvPr>
+            <p:extLst>
+              <p:ext uri="{386F3935-93C4-4BCD-93E2-E3B085C9AB24}">
+                <p16:designElem xmlns:p16="http://schemas.microsoft.com/office/powerpoint/2015/main" val="1"/>
+              </p:ext>
+            </p:extLst>
+          </p:nvPr>
+        </p:nvSpPr>
+        <p:spPr>
+          <a:xfrm>
+            <a:off x="0" y="0"/>
+            <a:ext cx="12192000" cy="6858000"/>
+          </a:xfrm>
+          <a:prstGeom prst="rect">
+            <a:avLst/>
+          </a:prstGeom>
+          <a:solidFill>
+            <a:srgbClr val="FFFFFF"/>
+          </a:solidFill>
+          <a:ln w="12700" cap="flat" cmpd="sng" algn="ctr">
+            <a:noFill/>
+            <a:prstDash val="solid"/>
+            <a:miter lim="800000"/>
+          </a:ln>
+          <a:effectLst/>
+          <a:extLst>
+            <a:ext uri="{91240B29-F687-4F45-9708-019B960494DF}">
+              <a14:hiddenLine xmlns:a14="http://schemas.microsoft.com/office/drawing/2010/main" w="12700" cap="flat" cmpd="sng" algn="ctr">
+                <a:solidFill>
+                  <a:schemeClr val="accent1">
+                    <a:shade val="50000"/>
+                  </a:schemeClr>
+                </a:solidFill>
+                <a:prstDash val="solid"/>
+                <a:miter lim="800000"/>
+              </a14:hiddenLine>
+            </a:ext>
+          </a:extLst>
+        </p:spPr>
+        <p:style>
+          <a:lnRef idx="2">
+            <a:schemeClr val="accent1">
+              <a:shade val="50000"/>
+            </a:schemeClr>
+          </a:lnRef>
+          <a:fillRef idx="1">
+            <a:schemeClr val="accent1"/>
+          </a:fillRef>
+          <a:effectRef idx="0">
+            <a:schemeClr val="accent1"/>
+          </a:effectRef>
+          <a:fontRef idx="minor">
+            <a:schemeClr val="lt1"/>
+          </a:fontRef>
+        </p:style>
+        <p:txBody>
+          <a:bodyPr rtlCol="0" anchor="ctr"/>
+          <a:lstStyle/>
+          <a:p>
+            <a:pPr algn="ctr"/>
+            <a:endParaRPr lang="en-US"/>
+          </a:p>
+        </p:txBody>
+      </p:sp>
+      <p:sp>
+        <p:nvSpPr>
+          <p:cNvPr id="11" name="Rectangle 10">
+            <a:extLst>
+              <a:ext uri="{FF2B5EF4-FFF2-40B4-BE49-F238E27FC236}">
+                <a16:creationId xmlns:a16="http://schemas.microsoft.com/office/drawing/2014/main" id="{14D36999-26F8-45E4-AB41-D485D0B0B1C2}"/>
+              </a:ext>
+              <a:ext uri="{C183D7F6-B498-43B3-948B-1728B52AA6E4}">
+                <adec:decorative xmlns:adec="http://schemas.microsoft.com/office/drawing/2017/decorative" val="1"/>
+              </a:ext>
+            </a:extLst>
+          </p:cNvPr>
+          <p:cNvSpPr>
+            <a:spLocks noGrp="1" noRot="1" noChangeAspect="1" noMove="1" noResize="1" noEditPoints="1" noAdjustHandles="1" noChangeArrowheads="1" noChangeShapeType="1" noTextEdit="1"/>
+          </p:cNvSpPr>
+          <p:nvPr>
+            <p:extLst>
+              <p:ext uri="{386F3935-93C4-4BCD-93E2-E3B085C9AB24}">
+                <p16:designElem xmlns:p16="http://schemas.microsoft.com/office/powerpoint/2015/main" val="1"/>
+              </p:ext>
+            </p:extLst>
+          </p:nvPr>
+        </p:nvSpPr>
+        <p:spPr>
+          <a:xfrm>
+            <a:off x="0" y="3440012"/>
+            <a:ext cx="12191999" cy="2803359"/>
+          </a:xfrm>
+          <a:prstGeom prst="rect">
+            <a:avLst/>
+          </a:prstGeom>
+          <a:gradFill>
+            <a:gsLst>
+              <a:gs pos="0">
+                <a:schemeClr val="accent1">
+                  <a:lumMod val="90000"/>
+                </a:schemeClr>
+              </a:gs>
+              <a:gs pos="25000">
+                <a:schemeClr val="accent1">
+                  <a:lumMod val="90000"/>
+                </a:schemeClr>
+              </a:gs>
+              <a:gs pos="94000">
+                <a:schemeClr val="bg2">
+                  <a:lumMod val="25000"/>
+                </a:schemeClr>
+              </a:gs>
+              <a:gs pos="100000">
+                <a:schemeClr val="bg2">
+                  <a:lumMod val="25000"/>
+                </a:schemeClr>
+              </a:gs>
+            </a:gsLst>
+            <a:lin ang="4200000" scaled="0"/>
+          </a:gradFill>
+          <a:ln>
+            <a:noFill/>
+          </a:ln>
+        </p:spPr>
+        <p:style>
+          <a:lnRef idx="2">
+            <a:schemeClr val="accent1">
+              <a:shade val="50000"/>
+            </a:schemeClr>
+          </a:lnRef>
+          <a:fillRef idx="1">
+            <a:schemeClr val="accent1"/>
+          </a:fillRef>
+          <a:effectRef idx="0">
+            <a:schemeClr val="accent1"/>
+          </a:effectRef>
+          <a:fontRef idx="minor">
+            <a:schemeClr val="lt1"/>
+          </a:fontRef>
+        </p:style>
+        <p:txBody>
+          <a:bodyPr rtlCol="0" anchor="ctr"/>
+          <a:lstStyle/>
+          <a:p>
+            <a:pPr algn="ctr"/>
+            <a:endParaRPr lang="en-US"/>
+          </a:p>
+        </p:txBody>
+      </p:sp>
+      <p:pic>
+        <p:nvPicPr>
+          <p:cNvPr id="13" name="Picture 12">
+            <a:extLst>
+              <a:ext uri="{FF2B5EF4-FFF2-40B4-BE49-F238E27FC236}">
+                <a16:creationId xmlns:a16="http://schemas.microsoft.com/office/drawing/2014/main" id="{30F8DA27-CE91-4AEB-B854-6F06B5485E3B}"/>
+              </a:ext>
+              <a:ext uri="{C183D7F6-B498-43B3-948B-1728B52AA6E4}">
+                <adec:decorative xmlns:adec="http://schemas.microsoft.com/office/drawing/2017/decorative" val="1"/>
+              </a:ext>
+            </a:extLst>
+          </p:cNvPr>
+          <p:cNvPicPr>
+            <a:picLocks noGrp="1" noRot="1" noChangeAspect="1" noMove="1" noResize="1" noEditPoints="1" noAdjustHandles="1" noChangeArrowheads="1" noChangeShapeType="1" noCrop="1"/>
+          </p:cNvPicPr>
+          <p:nvPr>
+            <p:extLst>
+              <p:ext uri="{386F3935-93C4-4BCD-93E2-E3B085C9AB24}">
+                <p16:designElem xmlns:p16="http://schemas.microsoft.com/office/powerpoint/2015/main" val="1"/>
+              </p:ext>
+            </p:extLst>
+          </p:nvPr>
+        </p:nvPicPr>
+        <p:blipFill rotWithShape="1">
+          <a:blip r:embed="rId2">
+            <a:extLst>
+              <a:ext uri="{28A0092B-C50C-407E-A947-70E740481C1C}">
+                <a14:useLocalDpi xmlns:a14="http://schemas.microsoft.com/office/drawing/2010/main" val="0"/>
+              </a:ext>
+            </a:extLst>
+          </a:blip>
+          <a:srcRect l="8235" t="23563" r="8214" b="45501"/>
+          <a:stretch/>
+        </p:blipFill>
+        <p:spPr>
+          <a:xfrm flipV="1">
+            <a:off x="1" y="2404067"/>
+            <a:ext cx="12191999" cy="2539327"/>
+          </a:xfrm>
+          <a:custGeom>
+            <a:avLst/>
+            <a:gdLst>
+              <a:gd name="connsiteX0" fmla="*/ 0 w 12191999"/>
+              <a:gd name="connsiteY0" fmla="*/ 4473360 h 4473360"/>
+              <a:gd name="connsiteX1" fmla="*/ 12191999 w 12191999"/>
+              <a:gd name="connsiteY1" fmla="*/ 4473360 h 4473360"/>
+              <a:gd name="connsiteX2" fmla="*/ 12191999 w 12191999"/>
+              <a:gd name="connsiteY2" fmla="*/ 0 h 4473360"/>
+              <a:gd name="connsiteX3" fmla="*/ 0 w 12191999"/>
+              <a:gd name="connsiteY3" fmla="*/ 0 h 4473360"/>
+            </a:gdLst>
+            <a:ahLst/>
+            <a:cxnLst>
+              <a:cxn ang="0">
+                <a:pos x="connsiteX0" y="connsiteY0"/>
+              </a:cxn>
+              <a:cxn ang="0">
+                <a:pos x="connsiteX1" y="connsiteY1"/>
+              </a:cxn>
+              <a:cxn ang="0">
+                <a:pos x="connsiteX2" y="connsiteY2"/>
+              </a:cxn>
+              <a:cxn ang="0">
+                <a:pos x="connsiteX3" y="connsiteY3"/>
+              </a:cxn>
+            </a:cxnLst>
+            <a:rect l="l" t="t" r="r" b="b"/>
+            <a:pathLst>
+              <a:path w="12191999" h="4473360">
+                <a:moveTo>
+                  <a:pt x="0" y="4473360"/>
+                </a:moveTo>
+                <a:lnTo>
+                  <a:pt x="12191999" y="4473360"/>
+                </a:lnTo>
+                <a:lnTo>
+                  <a:pt x="12191999" y="0"/>
+                </a:lnTo>
+                <a:lnTo>
+                  <a:pt x="0" y="0"/>
+                </a:lnTo>
+                <a:close/>
+              </a:path>
+            </a:pathLst>
+          </a:custGeom>
+        </p:spPr>
+      </p:pic>
+      <p:sp>
+        <p:nvSpPr>
+          <p:cNvPr id="2" name="Title 1">
+            <a:extLst>
+              <a:ext uri="{FF2B5EF4-FFF2-40B4-BE49-F238E27FC236}">
+                <a16:creationId xmlns:a16="http://schemas.microsoft.com/office/drawing/2014/main" id="{EE89E203-023D-4AA0-AF54-C7CDFC8AB9A6}"/>
+              </a:ext>
+            </a:extLst>
+          </p:cNvPr>
+          <p:cNvSpPr>
+            <a:spLocks noGrp="1"/>
+          </p:cNvSpPr>
+          <p:nvPr>
+            <p:ph type="title"/>
+          </p:nvPr>
+        </p:nvSpPr>
+        <p:spPr>
+          <a:xfrm>
+            <a:off x="755904" y="4494130"/>
+            <a:ext cx="10640754" cy="775845"/>
+          </a:xfrm>
+        </p:spPr>
+        <p:txBody>
+          <a:bodyPr vert="horz" lIns="91440" tIns="45720" rIns="91440" bIns="45720" rtlCol="0" anchor="b">
+            <a:normAutofit/>
+          </a:bodyPr>
+          <a:lstStyle/>
+          <a:p>
+            <a:pPr algn="ctr"/>
+            <a:r>
+              <a:rPr lang="en-US" b="1" kern="1200">
+                <a:solidFill>
+                  <a:srgbClr val="FFFFFF"/>
+                </a:solidFill>
+                <a:latin typeface="+mj-lt"/>
+                <a:ea typeface="+mj-ea"/>
+                <a:cs typeface="+mj-cs"/>
+              </a:rPr>
+              <a:t>Flow of Project</a:t>
+            </a:r>
+            <a:endParaRPr lang="en-US" b="1" kern="1200">
+              <a:solidFill>
+                <a:srgbClr val="FFFFFF"/>
+              </a:solidFill>
+              <a:latin typeface="+mj-lt"/>
+              <a:cs typeface="Calibri Light"/>
+            </a:endParaRPr>
+          </a:p>
+        </p:txBody>
+      </p:sp>
+      <p:pic>
+        <p:nvPicPr>
+          <p:cNvPr id="15" name="Picture 14">
+            <a:extLst>
+              <a:ext uri="{FF2B5EF4-FFF2-40B4-BE49-F238E27FC236}">
+                <a16:creationId xmlns:a16="http://schemas.microsoft.com/office/drawing/2014/main" id="{F7AF4E20-3DDE-4998-96BE-44EE182540FB}"/>
+              </a:ext>
+              <a:ext uri="{C183D7F6-B498-43B3-948B-1728B52AA6E4}">
+                <adec:decorative xmlns:adec="http://schemas.microsoft.com/office/drawing/2017/decorative" val="1"/>
+              </a:ext>
+            </a:extLst>
+          </p:cNvPr>
+          <p:cNvPicPr>
+            <a:picLocks noGrp="1" noRot="1" noChangeAspect="1" noMove="1" noResize="1" noEditPoints="1" noAdjustHandles="1" noChangeArrowheads="1" noChangeShapeType="1" noCrop="1"/>
+          </p:cNvPicPr>
+          <p:nvPr>
+            <p:extLst>
+              <p:ext uri="{386F3935-93C4-4BCD-93E2-E3B085C9AB24}">
+                <p16:designElem xmlns:p16="http://schemas.microsoft.com/office/powerpoint/2015/main" val="1"/>
+              </p:ext>
+            </p:extLst>
+          </p:nvPr>
+        </p:nvPicPr>
+        <p:blipFill rotWithShape="1">
+          <a:blip r:embed="rId2">
+            <a:extLst>
+              <a:ext uri="{28A0092B-C50C-407E-A947-70E740481C1C}">
+                <a14:useLocalDpi xmlns:a14="http://schemas.microsoft.com/office/drawing/2010/main" val="0"/>
+              </a:ext>
+            </a:extLst>
+          </a:blip>
+          <a:srcRect l="8235" t="-1" r="8214" b="86237"/>
+          <a:stretch/>
+        </p:blipFill>
+        <p:spPr>
+          <a:xfrm flipV="1">
+            <a:off x="0" y="5616534"/>
+            <a:ext cx="12191999" cy="1129775"/>
+          </a:xfrm>
+          <a:custGeom>
+            <a:avLst/>
+            <a:gdLst>
+              <a:gd name="connsiteX0" fmla="*/ 0 w 12191999"/>
+              <a:gd name="connsiteY0" fmla="*/ 4473360 h 4473360"/>
+              <a:gd name="connsiteX1" fmla="*/ 12191999 w 12191999"/>
+              <a:gd name="connsiteY1" fmla="*/ 4473360 h 4473360"/>
+              <a:gd name="connsiteX2" fmla="*/ 12191999 w 12191999"/>
+              <a:gd name="connsiteY2" fmla="*/ 0 h 4473360"/>
+              <a:gd name="connsiteX3" fmla="*/ 0 w 12191999"/>
+              <a:gd name="connsiteY3" fmla="*/ 0 h 4473360"/>
+            </a:gdLst>
+            <a:ahLst/>
+            <a:cxnLst>
+              <a:cxn ang="0">
+                <a:pos x="connsiteX0" y="connsiteY0"/>
+              </a:cxn>
+              <a:cxn ang="0">
+                <a:pos x="connsiteX1" y="connsiteY1"/>
+              </a:cxn>
+              <a:cxn ang="0">
+                <a:pos x="connsiteX2" y="connsiteY2"/>
+              </a:cxn>
+              <a:cxn ang="0">
+                <a:pos x="connsiteX3" y="connsiteY3"/>
+              </a:cxn>
+            </a:cxnLst>
+            <a:rect l="l" t="t" r="r" b="b"/>
+            <a:pathLst>
+              <a:path w="12191999" h="4473360">
+                <a:moveTo>
+                  <a:pt x="0" y="4473360"/>
+                </a:moveTo>
+                <a:lnTo>
+                  <a:pt x="12191999" y="4473360"/>
+                </a:lnTo>
+                <a:lnTo>
+                  <a:pt x="12191999" y="0"/>
+                </a:lnTo>
+                <a:lnTo>
+                  <a:pt x="0" y="0"/>
+                </a:lnTo>
+                <a:close/>
+              </a:path>
+            </a:pathLst>
+          </a:custGeom>
+        </p:spPr>
+      </p:pic>
+      <p:pic>
+        <p:nvPicPr>
+          <p:cNvPr id="4" name="Picture 4" descr="Graphical user interface, text, application, chat or text message&#10;&#10;Description automatically generated">
+            <a:extLst>
+              <a:ext uri="{FF2B5EF4-FFF2-40B4-BE49-F238E27FC236}">
+                <a16:creationId xmlns:a16="http://schemas.microsoft.com/office/drawing/2014/main" id="{EB4AB1FB-7312-4B4B-8433-447FAE78A825}"/>
+              </a:ext>
+            </a:extLst>
+          </p:cNvPr>
+          <p:cNvPicPr>
+            <a:picLocks noGrp="1" noChangeAspect="1"/>
+          </p:cNvPicPr>
+          <p:nvPr>
+            <p:ph idx="1"/>
+          </p:nvPr>
+        </p:nvPicPr>
+        <p:blipFill>
+          <a:blip r:embed="rId3"/>
+          <a:stretch>
+            <a:fillRect/>
+          </a:stretch>
+        </p:blipFill>
+        <p:spPr>
+          <a:xfrm>
+            <a:off x="1352803" y="371721"/>
+            <a:ext cx="9486395" cy="3201657"/>
+          </a:xfrm>
+          <a:prstGeom prst="rect">
+            <a:avLst/>
+          </a:prstGeom>
+        </p:spPr>
+      </p:pic>
+    </p:spTree>
+    <p:extLst>
+      <p:ext uri="{BB962C8B-B14F-4D97-AF65-F5344CB8AC3E}">
+        <p14:creationId xmlns:p14="http://schemas.microsoft.com/office/powerpoint/2010/main" val="4081721759"/>
+      </p:ext>
+    </p:extLst>
+  </p:cSld>
+  <p:clrMapOvr>
+    <a:masterClrMapping/>
+  </p:clrMapOvr>
+</p:sld>
+</file>
+
+<file path=ppt/slides/slide6.xml><?xml version="1.0" encoding="utf-8"?>
 <p:sld xmlns:a="http://schemas.openxmlformats.org/drawingml/2006/main" xmlns:r="http://schemas.openxmlformats.org/officeDocument/2006/relationships" xmlns:p="http://schemas.openxmlformats.org/presentationml/2006/main">
   <p:cSld>
     <p:bg>
@@ -4051,7 +5117,7 @@
       </p:grpSpPr>
       <p:sp useBgFill="1">
         <p:nvSpPr>
-          <p:cNvPr id="5" name="Rectangle 7">
+          <p:cNvPr id="8" name="Rectangle 7">
             <a:extLst>
               <a:ext uri="{FF2B5EF4-FFF2-40B4-BE49-F238E27FC236}">
                 <a16:creationId xmlns:a16="http://schemas.microsoft.com/office/drawing/2014/main" id="{3B854194-185D-494D-905C-7C7CB2E30F6E}"/>
@@ -4111,7 +5177,7 @@
       </p:sp>
       <p:sp>
         <p:nvSpPr>
-          <p:cNvPr id="6" name="Rectangle 9">
+          <p:cNvPr id="10" name="Rectangle 9">
             <a:extLst>
               <a:ext uri="{FF2B5EF4-FFF2-40B4-BE49-F238E27FC236}">
                 <a16:creationId xmlns:a16="http://schemas.microsoft.com/office/drawing/2014/main" id="{B4F5FA0D-0104-4987-8241-EFF7C85B88DE}"/>
@@ -4196,7 +5262,7 @@
       </p:sp>
       <p:pic>
         <p:nvPicPr>
-          <p:cNvPr id="7" name="Picture 11">
+          <p:cNvPr id="12" name="Picture 11">
             <a:extLst>
               <a:ext uri="{FF2B5EF4-FFF2-40B4-BE49-F238E27FC236}">
                 <a16:creationId xmlns:a16="http://schemas.microsoft.com/office/drawing/2014/main" id="{2897127E-6CEF-446C-BE87-93B7C46E49D1}"/>
@@ -4244,7 +5310,7 @@
           <p:cNvPr id="2" name="Title 1">
             <a:extLst>
               <a:ext uri="{FF2B5EF4-FFF2-40B4-BE49-F238E27FC236}">
-                <a16:creationId xmlns:a16="http://schemas.microsoft.com/office/drawing/2014/main" id="{6B782207-6314-492B-9660-6064003EA72A}"/>
+                <a16:creationId xmlns:a16="http://schemas.microsoft.com/office/drawing/2014/main" id="{DA745590-A410-4CAD-93BC-D0155A4FEA8C}"/>
               </a:ext>
             </a:extLst>
           </p:cNvPr>
@@ -4268,14 +5334,19 @@
           <a:lstStyle/>
           <a:p>
             <a:r>
-              <a:rPr lang="en-US">
+              <a:rPr lang="en-US" b="1">
                 <a:solidFill>
                   <a:srgbClr val="FFFFFF"/>
                 </a:solidFill>
                 <a:cs typeface="Calibri Light"/>
               </a:rPr>
-              <a:t>Phase - 2</a:t>
-            </a:r>
+              <a:t>Functionalities</a:t>
+            </a:r>
+            <a:endParaRPr lang="en-US" b="1">
+              <a:solidFill>
+                <a:srgbClr val="FFFFFF"/>
+              </a:solidFill>
+            </a:endParaRPr>
           </a:p>
         </p:txBody>
       </p:sp>
@@ -4284,7 +5355,7 @@
           <p:cNvPr id="3" name="Content Placeholder 2">
             <a:extLst>
               <a:ext uri="{FF2B5EF4-FFF2-40B4-BE49-F238E27FC236}">
-                <a16:creationId xmlns:a16="http://schemas.microsoft.com/office/drawing/2014/main" id="{88C88605-721D-4302-8B85-B28D8F5F7865}"/>
+                <a16:creationId xmlns:a16="http://schemas.microsoft.com/office/drawing/2014/main" id="{5007E9CF-00C3-495B-9066-5D9603830327}"/>
               </a:ext>
             </a:extLst>
           </p:cNvPr>
@@ -4308,40 +5379,43 @@
           <a:lstStyle/>
           <a:p>
             <a:r>
-              <a:rPr lang="en-US" sz="3200">
+              <a:rPr lang="en-US">
                 <a:solidFill>
                   <a:srgbClr val="000000"/>
                 </a:solidFill>
-                <a:ea typeface="+mn-lt"/>
-                <a:cs typeface="+mn-lt"/>
+                <a:cs typeface="Calibri"/>
               </a:rPr>
-              <a:t>Implementation of code for filling layout with colors</a:t>
-            </a:r>
-            <a:endParaRPr lang="en-US" sz="2400">
-              <a:solidFill>
-                <a:srgbClr val="000000"/>
-              </a:solidFill>
-              <a:ea typeface="+mn-lt"/>
-              <a:cs typeface="+mn-lt"/>
-            </a:endParaRPr>
-          </a:p>
-          <a:p>
-            <a:pPr>
-              <a:buNone/>
-            </a:pPr>
-            <a:endParaRPr lang="en-US" sz="2400">
-              <a:solidFill>
-                <a:srgbClr val="000000"/>
-              </a:solidFill>
-              <a:cs typeface="Calibri"/>
-            </a:endParaRPr>
+              <a:t>It is a multiplayer game</a:t>
+            </a:r>
+          </a:p>
+          <a:p>
+            <a:r>
+              <a:rPr lang="en-US">
+                <a:solidFill>
+                  <a:srgbClr val="000000"/>
+                </a:solidFill>
+                <a:cs typeface="Calibri"/>
+              </a:rPr>
+              <a:t>It has nice user interface</a:t>
+            </a:r>
+          </a:p>
+          <a:p>
+            <a:r>
+              <a:rPr lang="en-US">
+                <a:solidFill>
+                  <a:srgbClr val="000000"/>
+                </a:solidFill>
+                <a:cs typeface="Calibri"/>
+              </a:rPr>
+              <a:t>Also animations are there</a:t>
+            </a:r>
           </a:p>
         </p:txBody>
       </p:sp>
     </p:spTree>
     <p:extLst>
       <p:ext uri="{BB962C8B-B14F-4D97-AF65-F5344CB8AC3E}">
-        <p14:creationId xmlns:p14="http://schemas.microsoft.com/office/powerpoint/2010/main" val="3644621304"/>
+        <p14:creationId xmlns:p14="http://schemas.microsoft.com/office/powerpoint/2010/main" val="3363099340"/>
       </p:ext>
     </p:extLst>
   </p:cSld>
@@ -4351,7 +5425,7 @@
 </p:sld>
 </file>
 
-<file path=ppt/slides/slide5.xml><?xml version="1.0" encoding="utf-8"?>
+<file path=ppt/slides/slide7.xml><?xml version="1.0" encoding="utf-8"?>
 <p:sld xmlns:a="http://schemas.openxmlformats.org/drawingml/2006/main" xmlns:r="http://schemas.openxmlformats.org/officeDocument/2006/relationships" xmlns:p="http://schemas.openxmlformats.org/presentationml/2006/main">
   <p:cSld>
     <p:bg>
@@ -4376,12 +5450,12 @@
           <a:chExt cx="0" cy="0"/>
         </a:xfrm>
       </p:grpSpPr>
-      <p:sp useBgFill="1">
-        <p:nvSpPr>
-          <p:cNvPr id="5" name="Rectangle 7">
+      <p:sp>
+        <p:nvSpPr>
+          <p:cNvPr id="7" name="Rectangle 6">
             <a:extLst>
               <a:ext uri="{FF2B5EF4-FFF2-40B4-BE49-F238E27FC236}">
-                <a16:creationId xmlns:a16="http://schemas.microsoft.com/office/drawing/2014/main" id="{3B854194-185D-494D-905C-7C7CB2E30F6E}"/>
+                <a16:creationId xmlns:a16="http://schemas.microsoft.com/office/drawing/2014/main" id="{01C9CC24-B375-4226-BF2B-61FADBBA696A}"/>
               </a:ext>
               <a:ext uri="{C183D7F6-B498-43B3-948B-1728B52AA6E4}">
                 <adec:decorative xmlns:adec="http://schemas.microsoft.com/office/drawing/2017/decorative" val="1"/>
@@ -4401,12 +5475,15 @@
         </p:nvSpPr>
         <p:spPr>
           <a:xfrm>
-            <a:off x="1" y="0"/>
-            <a:ext cx="6082110" cy="6858000"/>
+            <a:off x="0" y="0"/>
+            <a:ext cx="12192000" cy="6858000"/>
           </a:xfrm>
           <a:prstGeom prst="rect">
             <a:avLst/>
           </a:prstGeom>
+          <a:solidFill>
+            <a:srgbClr val="FFFFFF"/>
+          </a:solidFill>
           <a:ln>
             <a:noFill/>
           </a:ln>
@@ -4438,10 +5515,10 @@
       </p:sp>
       <p:sp>
         <p:nvSpPr>
-          <p:cNvPr id="6" name="Rectangle 9">
+          <p:cNvPr id="9" name="Rectangle 8">
             <a:extLst>
               <a:ext uri="{FF2B5EF4-FFF2-40B4-BE49-F238E27FC236}">
-                <a16:creationId xmlns:a16="http://schemas.microsoft.com/office/drawing/2014/main" id="{B4F5FA0D-0104-4987-8241-EFF7C85B88DE}"/>
+                <a16:creationId xmlns:a16="http://schemas.microsoft.com/office/drawing/2014/main" id="{CD70A28E-4FD8-4474-A206-E15B5EBB303F}"/>
               </a:ext>
               <a:ext uri="{C183D7F6-B498-43B3-948B-1728B52AA6E4}">
                 <adec:decorative xmlns:adec="http://schemas.microsoft.com/office/drawing/2017/decorative" val="1"/>
@@ -4461,8 +5538,8 @@
         </p:nvSpPr>
         <p:spPr>
           <a:xfrm>
-            <a:off x="1" y="0"/>
-            <a:ext cx="12191998" cy="6858000"/>
+            <a:off x="3048" y="1084747"/>
+            <a:ext cx="12188952" cy="3294207"/>
           </a:xfrm>
           <a:prstGeom prst="rect">
             <a:avLst/>
@@ -4523,10 +5600,10 @@
       </p:sp>
       <p:pic>
         <p:nvPicPr>
-          <p:cNvPr id="7" name="Picture 11">
+          <p:cNvPr id="11" name="Picture 10">
             <a:extLst>
               <a:ext uri="{FF2B5EF4-FFF2-40B4-BE49-F238E27FC236}">
-                <a16:creationId xmlns:a16="http://schemas.microsoft.com/office/drawing/2014/main" id="{2897127E-6CEF-446C-BE87-93B7C46E49D1}"/>
+                <a16:creationId xmlns:a16="http://schemas.microsoft.com/office/drawing/2014/main" id="{39647E21-5366-4638-AC97-D8CD4111EB57}"/>
               </a:ext>
               <a:ext uri="{C183D7F6-B498-43B3-948B-1728B52AA6E4}">
                 <adec:decorative xmlns:adec="http://schemas.microsoft.com/office/drawing/2017/decorative" val="1"/>
@@ -4552,18 +5629,62 @@
               </a:ext>
             </a:extLst>
           </a:blip>
+          <a:srcRect l="8235" r="8214" b="45501"/>
           <a:stretch>
             <a:fillRect/>
           </a:stretch>
         </p:blipFill>
         <p:spPr>
-          <a:xfrm>
+          <a:xfrm flipV="1">
             <a:off x="0" y="0"/>
-            <a:ext cx="12192000" cy="6858000"/>
+            <a:ext cx="12191999" cy="4473360"/>
           </a:xfrm>
-          <a:prstGeom prst="rect">
+          <a:custGeom>
             <a:avLst/>
-          </a:prstGeom>
+            <a:gdLst>
+              <a:gd name="connsiteX0" fmla="*/ 0 w 12191999"/>
+              <a:gd name="connsiteY0" fmla="*/ 4473360 h 4473360"/>
+              <a:gd name="connsiteX1" fmla="*/ 12191999 w 12191999"/>
+              <a:gd name="connsiteY1" fmla="*/ 4473360 h 4473360"/>
+              <a:gd name="connsiteX2" fmla="*/ 12191999 w 12191999"/>
+              <a:gd name="connsiteY2" fmla="*/ 0 h 4473360"/>
+              <a:gd name="connsiteX3" fmla="*/ 0 w 12191999"/>
+              <a:gd name="connsiteY3" fmla="*/ 0 h 4473360"/>
+            </a:gdLst>
+            <a:ahLst/>
+            <a:cxnLst>
+              <a:cxn ang="0">
+                <a:pos x="connsiteX0" y="connsiteY0"/>
+              </a:cxn>
+              <a:cxn ang="0">
+                <a:pos x="connsiteX1" y="connsiteY1"/>
+              </a:cxn>
+              <a:cxn ang="0">
+                <a:pos x="connsiteX2" y="connsiteY2"/>
+              </a:cxn>
+              <a:cxn ang="0">
+                <a:pos x="connsiteX3" y="connsiteY3"/>
+              </a:cxn>
+            </a:cxnLst>
+            <a:rect l="l" t="t" r="r" b="b"/>
+            <a:pathLst>
+              <a:path w="12191999" h="4473360">
+                <a:moveTo>
+                  <a:pt x="0" y="4473360"/>
+                </a:moveTo>
+                <a:lnTo>
+                  <a:pt x="12191999" y="4473360"/>
+                </a:lnTo>
+                <a:lnTo>
+                  <a:pt x="12191999" y="0"/>
+                </a:lnTo>
+                <a:lnTo>
+                  <a:pt x="0" y="0"/>
+                </a:lnTo>
+                <a:close/>
+              </a:path>
+            </a:pathLst>
+          </a:custGeom>
         </p:spPr>
       </p:pic>
       <p:sp>
@@ -4571,7 +5692,7 @@
           <p:cNvPr id="2" name="Title 1">
             <a:extLst>
               <a:ext uri="{FF2B5EF4-FFF2-40B4-BE49-F238E27FC236}">
-                <a16:creationId xmlns:a16="http://schemas.microsoft.com/office/drawing/2014/main" id="{6B782207-6314-492B-9660-6064003EA72A}"/>
+                <a16:creationId xmlns:a16="http://schemas.microsoft.com/office/drawing/2014/main" id="{304DD6C7-8E4C-433B-B9AF-558B3A3B166F}"/>
               </a:ext>
             </a:extLst>
           </p:cNvPr>
@@ -4584,140 +5705,34 @@
         </p:nvSpPr>
         <p:spPr>
           <a:xfrm>
-            <a:off x="640079" y="2053641"/>
-            <a:ext cx="3669161" cy="2760098"/>
+            <a:off x="753925" y="2076450"/>
+            <a:ext cx="10684151" cy="1345134"/>
           </a:xfrm>
         </p:spPr>
         <p:txBody>
-          <a:bodyPr>
+          <a:bodyPr vert="horz" lIns="91440" tIns="45720" rIns="91440" bIns="45720" rtlCol="0" anchor="ctr">
             <a:normAutofit/>
           </a:bodyPr>
           <a:lstStyle/>
           <a:p>
-            <a:r>
-              <a:rPr lang="en-US">
+            <a:pPr algn="ctr"/>
+            <a:r>
+              <a:rPr lang="en-US" sz="5600" b="1" kern="1200">
                 <a:solidFill>
                   <a:srgbClr val="FFFFFF"/>
                 </a:solidFill>
-                <a:cs typeface="Calibri Light"/>
+                <a:latin typeface="+mj-lt"/>
+                <a:ea typeface="+mj-ea"/>
+                <a:cs typeface="+mj-cs"/>
               </a:rPr>
-              <a:t>Function to fill the shapes</a:t>
-            </a:r>
-          </a:p>
-        </p:txBody>
-      </p:sp>
-      <p:sp>
-        <p:nvSpPr>
-          <p:cNvPr id="3" name="Content Placeholder 2">
-            <a:extLst>
-              <a:ext uri="{FF2B5EF4-FFF2-40B4-BE49-F238E27FC236}">
-                <a16:creationId xmlns:a16="http://schemas.microsoft.com/office/drawing/2014/main" id="{88C88605-721D-4302-8B85-B28D8F5F7865}"/>
-              </a:ext>
-            </a:extLst>
-          </p:cNvPr>
-          <p:cNvSpPr>
-            <a:spLocks noGrp="1"/>
-          </p:cNvSpPr>
-          <p:nvPr>
-            <p:ph idx="1"/>
-          </p:nvPr>
-        </p:nvSpPr>
-        <p:spPr>
-          <a:xfrm>
-            <a:off x="6090574" y="801866"/>
-            <a:ext cx="5306084" cy="5230634"/>
-          </a:xfrm>
-        </p:spPr>
-        <p:txBody>
-          <a:bodyPr vert="horz" lIns="91440" tIns="45720" rIns="91440" bIns="45720" rtlCol="0" anchor="ctr">
-            <a:normAutofit/>
-          </a:bodyPr>
-          <a:lstStyle/>
-          <a:p>
-            <a:endParaRPr lang="en-US" sz="2400">
+              <a:t>THANK YOU</a:t>
+            </a:r>
+            <a:endParaRPr lang="en-US" sz="5600" b="1" kern="1200">
               <a:solidFill>
-                <a:srgbClr val="000000"/>
+                <a:srgbClr val="FFFFFF"/>
               </a:solidFill>
-              <a:cs typeface="Calibri"/>
-            </a:endParaRPr>
-          </a:p>
-          <a:p>
-            <a:endParaRPr lang="en-US" sz="2400">
-              <a:solidFill>
-                <a:srgbClr val="000000"/>
-              </a:solidFill>
-              <a:cs typeface="Calibri"/>
-            </a:endParaRPr>
-          </a:p>
-        </p:txBody>
-      </p:sp>
-      <p:sp>
-        <p:nvSpPr>
-          <p:cNvPr id="4" name="TextBox 3">
-            <a:extLst>
-              <a:ext uri="{FF2B5EF4-FFF2-40B4-BE49-F238E27FC236}">
-                <a16:creationId xmlns:a16="http://schemas.microsoft.com/office/drawing/2014/main" id="{8F909BA2-FE37-45C1-917B-DD136319F48F}"/>
-              </a:ext>
-            </a:extLst>
-          </p:cNvPr>
-          <p:cNvSpPr txBox="1"/>
-          <p:nvPr/>
-        </p:nvSpPr>
-        <p:spPr>
-          <a:xfrm>
-            <a:off x="6225310" y="2057399"/>
-            <a:ext cx="5294744" cy="3600986"/>
-          </a:xfrm>
-          <a:prstGeom prst="rect">
-            <a:avLst/>
-          </a:prstGeom>
-          <a:noFill/>
-        </p:spPr>
-        <p:txBody>
-          <a:bodyPr rot="0" spcFirstLastPara="0" vertOverflow="overflow" horzOverflow="overflow" vert="horz" wrap="square" lIns="91440" tIns="45720" rIns="91440" bIns="45720" numCol="1" spcCol="0" rtlCol="0" fromWordArt="0" anchor="t" anchorCtr="0" forceAA="0" compatLnSpc="1">
-            <a:prstTxWarp prst="textNoShape">
-              <a:avLst/>
-            </a:prstTxWarp>
-            <a:spAutoFit/>
-          </a:bodyPr>
-          <a:lstStyle/>
-          <a:p>
-            <a:pPr marL="285750" indent="-285750">
-              <a:buFont typeface="Arial"/>
-              <a:buChar char="•"/>
-            </a:pPr>
-            <a:r>
-              <a:rPr lang="en-US" sz="2400">
-                <a:cs typeface="Calibri"/>
-              </a:rPr>
-              <a:t>Flood fill is the function in which we are giving a point which is inside that shape, new color and old color as arguments.</a:t>
-            </a:r>
-          </a:p>
-          <a:p>
-            <a:endParaRPr lang="en-US" sz="2400">
-              <a:cs typeface="Calibri"/>
-            </a:endParaRPr>
-          </a:p>
-          <a:p>
-            <a:pPr marL="285750" indent="-285750">
-              <a:buFont typeface="Arial"/>
-              <a:buChar char="•"/>
-            </a:pPr>
-            <a:r>
-              <a:rPr lang="en-US" sz="2400">
-                <a:cs typeface="Calibri"/>
-              </a:rPr>
-              <a:t>Then it will fill that shape till whatever it is till there is old color and filled it with the given new color</a:t>
-            </a:r>
-          </a:p>
-          <a:p>
-            <a:endParaRPr lang="en-US">
-              <a:cs typeface="Calibri"/>
-            </a:endParaRPr>
-          </a:p>
-          <a:p>
-            <a:endParaRPr lang="en-US">
-              <a:cs typeface="Calibri"/>
+              <a:latin typeface="+mj-lt"/>
+              <a:cs typeface="Calibri Light"/>
             </a:endParaRPr>
           </a:p>
         </p:txBody>
@@ -4725,812 +5740,105 @@
     </p:spTree>
     <p:extLst>
       <p:ext uri="{BB962C8B-B14F-4D97-AF65-F5344CB8AC3E}">
-        <p14:creationId xmlns:p14="http://schemas.microsoft.com/office/powerpoint/2010/main" val="2419021002"/>
+        <p14:creationId xmlns:p14="http://schemas.microsoft.com/office/powerpoint/2010/main" val="1990803518"/>
       </p:ext>
     </p:extLst>
   </p:cSld>
   <p:clrMapOvr>
     <a:masterClrMapping/>
   </p:clrMapOvr>
-</p:sld>
-</file>
-
-<file path=ppt/slides/slide6.xml><?xml version="1.0" encoding="utf-8"?>
-<p:sld xmlns:a="http://schemas.openxmlformats.org/drawingml/2006/main" xmlns:r="http://schemas.openxmlformats.org/officeDocument/2006/relationships" xmlns:p="http://schemas.openxmlformats.org/presentationml/2006/main">
-  <p:cSld>
-    <p:bg>
-      <p:bgPr>
-        <a:solidFill>
-          <a:schemeClr val="bg1"/>
-        </a:solidFill>
-        <a:effectLst/>
-      </p:bgPr>
-    </p:bg>
-    <p:spTree>
-      <p:nvGrpSpPr>
-        <p:cNvPr id="1" name=""/>
-        <p:cNvGrpSpPr/>
-        <p:nvPr/>
-      </p:nvGrpSpPr>
-      <p:grpSpPr>
-        <a:xfrm>
-          <a:off x="0" y="0"/>
-          <a:ext cx="0" cy="0"/>
-          <a:chOff x="0" y="0"/>
-          <a:chExt cx="0" cy="0"/>
-        </a:xfrm>
-      </p:grpSpPr>
-      <p:sp useBgFill="1">
-        <p:nvSpPr>
-          <p:cNvPr id="5" name="Rectangle 7">
-            <a:extLst>
-              <a:ext uri="{FF2B5EF4-FFF2-40B4-BE49-F238E27FC236}">
-                <a16:creationId xmlns:a16="http://schemas.microsoft.com/office/drawing/2014/main" id="{3B854194-185D-494D-905C-7C7CB2E30F6E}"/>
-              </a:ext>
-              <a:ext uri="{C183D7F6-B498-43B3-948B-1728B52AA6E4}">
-                <adec:decorative xmlns:adec="http://schemas.microsoft.com/office/drawing/2017/decorative" val="1"/>
-              </a:ext>
-            </a:extLst>
-          </p:cNvPr>
-          <p:cNvSpPr>
-            <a:spLocks noGrp="1" noRot="1" noChangeAspect="1" noMove="1" noResize="1" noEditPoints="1" noAdjustHandles="1" noChangeArrowheads="1" noChangeShapeType="1" noTextEdit="1"/>
-          </p:cNvSpPr>
-          <p:nvPr>
-            <p:extLst>
-              <p:ext uri="{386F3935-93C4-4BCD-93E2-E3B085C9AB24}">
-                <p16:designElem xmlns:p16="http://schemas.microsoft.com/office/powerpoint/2015/main" val="1"/>
-              </p:ext>
-            </p:extLst>
-          </p:nvPr>
-        </p:nvSpPr>
-        <p:spPr>
-          <a:xfrm>
-            <a:off x="1" y="0"/>
-            <a:ext cx="6082110" cy="6858000"/>
-          </a:xfrm>
-          <a:prstGeom prst="rect">
-            <a:avLst/>
-          </a:prstGeom>
-          <a:ln>
-            <a:noFill/>
-          </a:ln>
-        </p:spPr>
-        <p:style>
-          <a:lnRef idx="2">
-            <a:schemeClr val="accent1">
-              <a:shade val="50000"/>
-            </a:schemeClr>
-          </a:lnRef>
-          <a:fillRef idx="1">
-            <a:schemeClr val="accent1"/>
-          </a:fillRef>
-          <a:effectRef idx="0">
-            <a:schemeClr val="accent1"/>
-          </a:effectRef>
-          <a:fontRef idx="minor">
-            <a:schemeClr val="lt1"/>
-          </a:fontRef>
-        </p:style>
-        <p:txBody>
-          <a:bodyPr rtlCol="0" anchor="ctr"/>
-          <a:lstStyle/>
-          <a:p>
-            <a:pPr algn="ctr"/>
-            <a:endParaRPr lang="en-US"/>
-          </a:p>
-        </p:txBody>
-      </p:sp>
-      <p:sp>
-        <p:nvSpPr>
-          <p:cNvPr id="6" name="Rectangle 9">
-            <a:extLst>
-              <a:ext uri="{FF2B5EF4-FFF2-40B4-BE49-F238E27FC236}">
-                <a16:creationId xmlns:a16="http://schemas.microsoft.com/office/drawing/2014/main" id="{B4F5FA0D-0104-4987-8241-EFF7C85B88DE}"/>
-              </a:ext>
-              <a:ext uri="{C183D7F6-B498-43B3-948B-1728B52AA6E4}">
-                <adec:decorative xmlns:adec="http://schemas.microsoft.com/office/drawing/2017/decorative" val="1"/>
-              </a:ext>
-            </a:extLst>
-          </p:cNvPr>
-          <p:cNvSpPr>
-            <a:spLocks noGrp="1" noRot="1" noChangeAspect="1" noMove="1" noResize="1" noEditPoints="1" noAdjustHandles="1" noChangeArrowheads="1" noChangeShapeType="1" noTextEdit="1"/>
-          </p:cNvSpPr>
-          <p:nvPr>
-            <p:extLst>
-              <p:ext uri="{386F3935-93C4-4BCD-93E2-E3B085C9AB24}">
-                <p16:designElem xmlns:p16="http://schemas.microsoft.com/office/powerpoint/2015/main" val="1"/>
-              </p:ext>
-            </p:extLst>
-          </p:nvPr>
-        </p:nvSpPr>
-        <p:spPr>
-          <a:xfrm>
-            <a:off x="1" y="0"/>
-            <a:ext cx="12191998" cy="6858000"/>
-          </a:xfrm>
-          <a:prstGeom prst="rect">
-            <a:avLst/>
-          </a:prstGeom>
-          <a:gradFill>
-            <a:gsLst>
-              <a:gs pos="0">
-                <a:schemeClr val="accent1">
-                  <a:lumMod val="90000"/>
-                </a:schemeClr>
-              </a:gs>
-              <a:gs pos="25000">
-                <a:schemeClr val="accent1">
-                  <a:lumMod val="90000"/>
-                </a:schemeClr>
-              </a:gs>
-              <a:gs pos="94000">
-                <a:schemeClr val="bg2">
-                  <a:lumMod val="25000"/>
-                </a:schemeClr>
-              </a:gs>
-              <a:gs pos="100000">
-                <a:schemeClr val="bg2">
-                  <a:lumMod val="25000"/>
-                </a:schemeClr>
-              </a:gs>
-            </a:gsLst>
-            <a:lin ang="4200000" scaled="0"/>
-          </a:gradFill>
-          <a:ln>
-            <a:noFill/>
-          </a:ln>
-        </p:spPr>
-        <p:style>
-          <a:lnRef idx="2">
-            <a:schemeClr val="accent1">
-              <a:shade val="50000"/>
-            </a:schemeClr>
-          </a:lnRef>
-          <a:fillRef idx="1">
-            <a:schemeClr val="accent1"/>
-          </a:fillRef>
-          <a:effectRef idx="0">
-            <a:schemeClr val="accent1"/>
-          </a:effectRef>
-          <a:fontRef idx="minor">
-            <a:schemeClr val="lt1"/>
-          </a:fontRef>
-        </p:style>
-        <p:txBody>
-          <a:bodyPr rtlCol="0" anchor="ctr"/>
-          <a:lstStyle/>
-          <a:p>
-            <a:pPr algn="ctr"/>
-            <a:endParaRPr lang="en-US"/>
-          </a:p>
-        </p:txBody>
-      </p:sp>
-      <p:pic>
-        <p:nvPicPr>
-          <p:cNvPr id="7" name="Picture 11">
-            <a:extLst>
-              <a:ext uri="{FF2B5EF4-FFF2-40B4-BE49-F238E27FC236}">
-                <a16:creationId xmlns:a16="http://schemas.microsoft.com/office/drawing/2014/main" id="{2897127E-6CEF-446C-BE87-93B7C46E49D1}"/>
-              </a:ext>
-              <a:ext uri="{C183D7F6-B498-43B3-948B-1728B52AA6E4}">
-                <adec:decorative xmlns:adec="http://schemas.microsoft.com/office/drawing/2017/decorative" val="1"/>
-              </a:ext>
-            </a:extLst>
-          </p:cNvPr>
-          <p:cNvPicPr>
-            <a:picLocks noGrp="1" noRot="1" noChangeAspect="1" noMove="1" noResize="1" noEditPoints="1" noAdjustHandles="1" noChangeArrowheads="1" noChangeShapeType="1" noCrop="1"/>
-          </p:cNvPicPr>
-          <p:nvPr>
-            <p:extLst>
-              <p:ext uri="{386F3935-93C4-4BCD-93E2-E3B085C9AB24}">
-                <p16:designElem xmlns:p16="http://schemas.microsoft.com/office/powerpoint/2015/main" val="1"/>
-              </p:ext>
-            </p:extLst>
-          </p:nvPr>
-        </p:nvPicPr>
-        <p:blipFill>
-          <a:blip r:embed="rId2">
-            <a:extLst>
-              <a:ext uri="{28A0092B-C50C-407E-A947-70E740481C1C}">
-                <a14:useLocalDpi xmlns:a14="http://schemas.microsoft.com/office/drawing/2010/main" val="0"/>
-              </a:ext>
-            </a:extLst>
-          </a:blip>
-          <a:stretch>
-            <a:fillRect/>
-          </a:stretch>
-        </p:blipFill>
-        <p:spPr>
-          <a:xfrm>
-            <a:off x="0" y="0"/>
-            <a:ext cx="12192000" cy="6858000"/>
-          </a:xfrm>
-          <a:prstGeom prst="rect">
-            <a:avLst/>
-          </a:prstGeom>
-        </p:spPr>
-      </p:pic>
-      <p:sp>
-        <p:nvSpPr>
-          <p:cNvPr id="2" name="Title 1">
-            <a:extLst>
-              <a:ext uri="{FF2B5EF4-FFF2-40B4-BE49-F238E27FC236}">
-                <a16:creationId xmlns:a16="http://schemas.microsoft.com/office/drawing/2014/main" id="{6B782207-6314-492B-9660-6064003EA72A}"/>
-              </a:ext>
-            </a:extLst>
-          </p:cNvPr>
-          <p:cNvSpPr>
-            <a:spLocks noGrp="1"/>
-          </p:cNvSpPr>
-          <p:nvPr>
-            <p:ph type="title"/>
-          </p:nvPr>
-        </p:nvSpPr>
-        <p:spPr>
-          <a:xfrm>
-            <a:off x="640079" y="2053641"/>
-            <a:ext cx="3669161" cy="2760098"/>
-          </a:xfrm>
-        </p:spPr>
-        <p:txBody>
-          <a:bodyPr>
-            <a:normAutofit/>
-          </a:bodyPr>
-          <a:lstStyle/>
-          <a:p>
-            <a:r>
-              <a:rPr lang="en-US" sz="3600">
-                <a:solidFill>
-                  <a:schemeClr val="bg1"/>
-                </a:solidFill>
-                <a:ea typeface="+mj-lt"/>
-                <a:cs typeface="+mj-lt"/>
-              </a:rPr>
-              <a:t>Implementation of fill horizontal and  vertical function</a:t>
-            </a:r>
-            <a:endParaRPr lang="en-US" sz="3600">
-              <a:solidFill>
-                <a:schemeClr val="bg1"/>
-              </a:solidFill>
-            </a:endParaRPr>
-          </a:p>
-        </p:txBody>
-      </p:sp>
-      <p:sp>
-        <p:nvSpPr>
-          <p:cNvPr id="3" name="Content Placeholder 2">
-            <a:extLst>
-              <a:ext uri="{FF2B5EF4-FFF2-40B4-BE49-F238E27FC236}">
-                <a16:creationId xmlns:a16="http://schemas.microsoft.com/office/drawing/2014/main" id="{88C88605-721D-4302-8B85-B28D8F5F7865}"/>
-              </a:ext>
-            </a:extLst>
-          </p:cNvPr>
-          <p:cNvSpPr>
-            <a:spLocks noGrp="1"/>
-          </p:cNvSpPr>
-          <p:nvPr>
-            <p:ph idx="1"/>
-          </p:nvPr>
-        </p:nvSpPr>
-        <p:spPr>
-          <a:xfrm>
-            <a:off x="6215265" y="926557"/>
-            <a:ext cx="5306084" cy="5230634"/>
-          </a:xfrm>
-        </p:spPr>
-        <p:txBody>
-          <a:bodyPr vert="horz" lIns="91440" tIns="45720" rIns="91440" bIns="45720" rtlCol="0" anchor="ctr">
-            <a:normAutofit/>
-          </a:bodyPr>
-          <a:lstStyle/>
-          <a:p>
-            <a:endParaRPr lang="en-US" sz="2400">
-              <a:solidFill>
-                <a:srgbClr val="000000"/>
-              </a:solidFill>
-              <a:cs typeface="Calibri"/>
-            </a:endParaRPr>
-          </a:p>
-          <a:p>
-            <a:endParaRPr lang="en-US" sz="2400">
-              <a:solidFill>
-                <a:srgbClr val="000000"/>
-              </a:solidFill>
-              <a:cs typeface="Calibri"/>
-            </a:endParaRPr>
-          </a:p>
-        </p:txBody>
-      </p:sp>
-      <p:sp>
-        <p:nvSpPr>
-          <p:cNvPr id="4" name="TextBox 3">
-            <a:extLst>
-              <a:ext uri="{FF2B5EF4-FFF2-40B4-BE49-F238E27FC236}">
-                <a16:creationId xmlns:a16="http://schemas.microsoft.com/office/drawing/2014/main" id="{8F909BA2-FE37-45C1-917B-DD136319F48F}"/>
-              </a:ext>
-            </a:extLst>
-          </p:cNvPr>
-          <p:cNvSpPr txBox="1"/>
-          <p:nvPr/>
-        </p:nvSpPr>
-        <p:spPr>
-          <a:xfrm>
-            <a:off x="6225310" y="2057399"/>
-            <a:ext cx="5294744" cy="3600986"/>
-          </a:xfrm>
-          <a:prstGeom prst="rect">
-            <a:avLst/>
-          </a:prstGeom>
-          <a:noFill/>
-        </p:spPr>
-        <p:txBody>
-          <a:bodyPr rot="0" spcFirstLastPara="0" vertOverflow="overflow" horzOverflow="overflow" vert="horz" wrap="square" lIns="91440" tIns="45720" rIns="91440" bIns="45720" numCol="1" spcCol="0" rtlCol="0" fromWordArt="0" anchor="t" anchorCtr="0" forceAA="0" compatLnSpc="1">
-            <a:prstTxWarp prst="textNoShape">
-              <a:avLst/>
-            </a:prstTxWarp>
-            <a:spAutoFit/>
-          </a:bodyPr>
-          <a:lstStyle/>
-          <a:p>
-            <a:pPr marL="285750" indent="-285750">
-              <a:buFont typeface="Arial"/>
-              <a:buChar char="•"/>
-            </a:pPr>
-            <a:r>
-              <a:rPr lang="en-US" sz="2400">
-                <a:cs typeface="Calibri"/>
-              </a:rPr>
-              <a:t>In this fill horizontal and fill vertical function , we are giving a point, new color and old color to the flood fill function and using for loop we are calling it 5 times to fill those 5 boxes</a:t>
-            </a:r>
-          </a:p>
-          <a:p>
-            <a:pPr marL="285750" indent="-285750">
-              <a:buFont typeface="Arial"/>
-              <a:buChar char="•"/>
-            </a:pPr>
-            <a:endParaRPr lang="en-US" sz="2400">
-              <a:cs typeface="Calibri"/>
-            </a:endParaRPr>
-          </a:p>
-          <a:p>
-            <a:pPr marL="285750" indent="-285750">
-              <a:buFont typeface="Arial"/>
-              <a:buChar char="•"/>
-            </a:pPr>
-            <a:r>
-              <a:rPr lang="en-US" sz="2400">
-                <a:cs typeface="Calibri"/>
-              </a:rPr>
-              <a:t>It fills those all vertical and horizontal shapes</a:t>
-            </a:r>
-          </a:p>
-          <a:p>
-            <a:endParaRPr lang="en-US">
-              <a:cs typeface="Calibri"/>
-            </a:endParaRPr>
-          </a:p>
-          <a:p>
-            <a:endParaRPr lang="en-US">
-              <a:cs typeface="Calibri"/>
-            </a:endParaRPr>
-          </a:p>
-        </p:txBody>
-      </p:sp>
-    </p:spTree>
-    <p:extLst>
-      <p:ext uri="{BB962C8B-B14F-4D97-AF65-F5344CB8AC3E}">
-        <p14:creationId xmlns:p14="http://schemas.microsoft.com/office/powerpoint/2010/main" val="3773180823"/>
-      </p:ext>
-    </p:extLst>
-  </p:cSld>
-  <p:clrMapOvr>
-    <a:masterClrMapping/>
-  </p:clrMapOvr>
-</p:sld>
-</file>
-
-<file path=ppt/slides/slide7.xml><?xml version="1.0" encoding="utf-8"?>
-<p:sld xmlns:a="http://schemas.openxmlformats.org/drawingml/2006/main" xmlns:r="http://schemas.openxmlformats.org/officeDocument/2006/relationships" xmlns:p="http://schemas.openxmlformats.org/presentationml/2006/main">
-  <p:cSld>
-    <p:bg>
-      <p:bgPr>
-        <a:solidFill>
-          <a:schemeClr val="bg1"/>
-        </a:solidFill>
-        <a:effectLst/>
-      </p:bgPr>
-    </p:bg>
-    <p:spTree>
-      <p:nvGrpSpPr>
-        <p:cNvPr id="1" name=""/>
-        <p:cNvGrpSpPr/>
-        <p:nvPr/>
-      </p:nvGrpSpPr>
-      <p:grpSpPr>
-        <a:xfrm>
-          <a:off x="0" y="0"/>
-          <a:ext cx="0" cy="0"/>
-          <a:chOff x="0" y="0"/>
-          <a:chExt cx="0" cy="0"/>
-        </a:xfrm>
-      </p:grpSpPr>
-      <p:sp useBgFill="1">
-        <p:nvSpPr>
-          <p:cNvPr id="5" name="Rectangle 7">
-            <a:extLst>
-              <a:ext uri="{FF2B5EF4-FFF2-40B4-BE49-F238E27FC236}">
-                <a16:creationId xmlns:a16="http://schemas.microsoft.com/office/drawing/2014/main" id="{3B854194-185D-494D-905C-7C7CB2E30F6E}"/>
-              </a:ext>
-              <a:ext uri="{C183D7F6-B498-43B3-948B-1728B52AA6E4}">
-                <adec:decorative xmlns:adec="http://schemas.microsoft.com/office/drawing/2017/decorative" val="1"/>
-              </a:ext>
-            </a:extLst>
-          </p:cNvPr>
-          <p:cNvSpPr>
-            <a:spLocks noGrp="1" noRot="1" noChangeAspect="1" noMove="1" noResize="1" noEditPoints="1" noAdjustHandles="1" noChangeArrowheads="1" noChangeShapeType="1" noTextEdit="1"/>
-          </p:cNvSpPr>
-          <p:nvPr>
-            <p:extLst>
-              <p:ext uri="{386F3935-93C4-4BCD-93E2-E3B085C9AB24}">
-                <p16:designElem xmlns:p16="http://schemas.microsoft.com/office/powerpoint/2015/main" val="1"/>
-              </p:ext>
-            </p:extLst>
-          </p:nvPr>
-        </p:nvSpPr>
-        <p:spPr>
-          <a:xfrm>
-            <a:off x="1" y="0"/>
-            <a:ext cx="6082110" cy="6858000"/>
-          </a:xfrm>
-          <a:prstGeom prst="rect">
-            <a:avLst/>
-          </a:prstGeom>
-          <a:ln>
-            <a:noFill/>
-          </a:ln>
-        </p:spPr>
-        <p:style>
-          <a:lnRef idx="2">
-            <a:schemeClr val="accent1">
-              <a:shade val="50000"/>
-            </a:schemeClr>
-          </a:lnRef>
-          <a:fillRef idx="1">
-            <a:schemeClr val="accent1"/>
-          </a:fillRef>
-          <a:effectRef idx="0">
-            <a:schemeClr val="accent1"/>
-          </a:effectRef>
-          <a:fontRef idx="minor">
-            <a:schemeClr val="lt1"/>
-          </a:fontRef>
-        </p:style>
-        <p:txBody>
-          <a:bodyPr rtlCol="0" anchor="ctr"/>
-          <a:lstStyle/>
-          <a:p>
-            <a:pPr algn="ctr"/>
-            <a:endParaRPr lang="en-US"/>
-          </a:p>
-        </p:txBody>
-      </p:sp>
-      <p:sp>
-        <p:nvSpPr>
-          <p:cNvPr id="6" name="Rectangle 9">
-            <a:extLst>
-              <a:ext uri="{FF2B5EF4-FFF2-40B4-BE49-F238E27FC236}">
-                <a16:creationId xmlns:a16="http://schemas.microsoft.com/office/drawing/2014/main" id="{B4F5FA0D-0104-4987-8241-EFF7C85B88DE}"/>
-              </a:ext>
-              <a:ext uri="{C183D7F6-B498-43B3-948B-1728B52AA6E4}">
-                <adec:decorative xmlns:adec="http://schemas.microsoft.com/office/drawing/2017/decorative" val="1"/>
-              </a:ext>
-            </a:extLst>
-          </p:cNvPr>
-          <p:cNvSpPr>
-            <a:spLocks noGrp="1" noRot="1" noChangeAspect="1" noMove="1" noResize="1" noEditPoints="1" noAdjustHandles="1" noChangeArrowheads="1" noChangeShapeType="1" noTextEdit="1"/>
-          </p:cNvSpPr>
-          <p:nvPr>
-            <p:extLst>
-              <p:ext uri="{386F3935-93C4-4BCD-93E2-E3B085C9AB24}">
-                <p16:designElem xmlns:p16="http://schemas.microsoft.com/office/powerpoint/2015/main" val="1"/>
-              </p:ext>
-            </p:extLst>
-          </p:nvPr>
-        </p:nvSpPr>
-        <p:spPr>
-          <a:xfrm>
-            <a:off x="1" y="0"/>
-            <a:ext cx="12191998" cy="6858000"/>
-          </a:xfrm>
-          <a:prstGeom prst="rect">
-            <a:avLst/>
-          </a:prstGeom>
-          <a:gradFill>
-            <a:gsLst>
-              <a:gs pos="0">
-                <a:schemeClr val="accent1">
-                  <a:lumMod val="90000"/>
-                </a:schemeClr>
-              </a:gs>
-              <a:gs pos="25000">
-                <a:schemeClr val="accent1">
-                  <a:lumMod val="90000"/>
-                </a:schemeClr>
-              </a:gs>
-              <a:gs pos="94000">
-                <a:schemeClr val="bg2">
-                  <a:lumMod val="25000"/>
-                </a:schemeClr>
-              </a:gs>
-              <a:gs pos="100000">
-                <a:schemeClr val="bg2">
-                  <a:lumMod val="25000"/>
-                </a:schemeClr>
-              </a:gs>
-            </a:gsLst>
-            <a:lin ang="4200000" scaled="0"/>
-          </a:gradFill>
-          <a:ln>
-            <a:noFill/>
-          </a:ln>
-        </p:spPr>
-        <p:style>
-          <a:lnRef idx="2">
-            <a:schemeClr val="accent1">
-              <a:shade val="50000"/>
-            </a:schemeClr>
-          </a:lnRef>
-          <a:fillRef idx="1">
-            <a:schemeClr val="accent1"/>
-          </a:fillRef>
-          <a:effectRef idx="0">
-            <a:schemeClr val="accent1"/>
-          </a:effectRef>
-          <a:fontRef idx="minor">
-            <a:schemeClr val="lt1"/>
-          </a:fontRef>
-        </p:style>
-        <p:txBody>
-          <a:bodyPr rtlCol="0" anchor="ctr"/>
-          <a:lstStyle/>
-          <a:p>
-            <a:pPr algn="ctr"/>
-            <a:endParaRPr lang="en-US"/>
-          </a:p>
-        </p:txBody>
-      </p:sp>
-      <p:pic>
-        <p:nvPicPr>
-          <p:cNvPr id="7" name="Picture 11">
-            <a:extLst>
-              <a:ext uri="{FF2B5EF4-FFF2-40B4-BE49-F238E27FC236}">
-                <a16:creationId xmlns:a16="http://schemas.microsoft.com/office/drawing/2014/main" id="{2897127E-6CEF-446C-BE87-93B7C46E49D1}"/>
-              </a:ext>
-              <a:ext uri="{C183D7F6-B498-43B3-948B-1728B52AA6E4}">
-                <adec:decorative xmlns:adec="http://schemas.microsoft.com/office/drawing/2017/decorative" val="1"/>
-              </a:ext>
-            </a:extLst>
-          </p:cNvPr>
-          <p:cNvPicPr>
-            <a:picLocks noGrp="1" noRot="1" noChangeAspect="1" noMove="1" noResize="1" noEditPoints="1" noAdjustHandles="1" noChangeArrowheads="1" noChangeShapeType="1" noCrop="1"/>
-          </p:cNvPicPr>
-          <p:nvPr>
-            <p:extLst>
-              <p:ext uri="{386F3935-93C4-4BCD-93E2-E3B085C9AB24}">
-                <p16:designElem xmlns:p16="http://schemas.microsoft.com/office/powerpoint/2015/main" val="1"/>
-              </p:ext>
-            </p:extLst>
-          </p:nvPr>
-        </p:nvPicPr>
-        <p:blipFill>
-          <a:blip r:embed="rId2">
-            <a:extLst>
-              <a:ext uri="{28A0092B-C50C-407E-A947-70E740481C1C}">
-                <a14:useLocalDpi xmlns:a14="http://schemas.microsoft.com/office/drawing/2010/main" val="0"/>
-              </a:ext>
-            </a:extLst>
-          </a:blip>
-          <a:stretch>
-            <a:fillRect/>
-          </a:stretch>
-        </p:blipFill>
-        <p:spPr>
-          <a:xfrm>
-            <a:off x="0" y="0"/>
-            <a:ext cx="12192000" cy="6858000"/>
-          </a:xfrm>
-          <a:prstGeom prst="rect">
-            <a:avLst/>
-          </a:prstGeom>
-        </p:spPr>
-      </p:pic>
-      <p:sp>
-        <p:nvSpPr>
-          <p:cNvPr id="2" name="Title 1">
-            <a:extLst>
-              <a:ext uri="{FF2B5EF4-FFF2-40B4-BE49-F238E27FC236}">
-                <a16:creationId xmlns:a16="http://schemas.microsoft.com/office/drawing/2014/main" id="{6B782207-6314-492B-9660-6064003EA72A}"/>
-              </a:ext>
-            </a:extLst>
-          </p:cNvPr>
-          <p:cNvSpPr>
-            <a:spLocks noGrp="1"/>
-          </p:cNvSpPr>
-          <p:nvPr>
-            <p:ph type="title"/>
-          </p:nvPr>
-        </p:nvSpPr>
-        <p:spPr>
-          <a:xfrm>
-            <a:off x="640079" y="2053641"/>
-            <a:ext cx="3669161" cy="2760098"/>
-          </a:xfrm>
-        </p:spPr>
-        <p:txBody>
-          <a:bodyPr>
-            <a:normAutofit/>
-          </a:bodyPr>
-          <a:lstStyle/>
-          <a:p>
-            <a:r>
-              <a:rPr lang="en-US" sz="3600">
-                <a:solidFill>
-                  <a:schemeClr val="bg1"/>
-                </a:solidFill>
-                <a:ea typeface="+mj-lt"/>
-                <a:cs typeface="+mj-lt"/>
-              </a:rPr>
-              <a:t>Implementation of fill color function</a:t>
-            </a:r>
-            <a:endParaRPr lang="en-US">
-              <a:solidFill>
-                <a:schemeClr val="bg1"/>
-              </a:solidFill>
-              <a:ea typeface="+mj-lt"/>
-              <a:cs typeface="+mj-lt"/>
-            </a:endParaRPr>
-          </a:p>
-        </p:txBody>
-      </p:sp>
-      <p:sp>
-        <p:nvSpPr>
-          <p:cNvPr id="3" name="Content Placeholder 2">
-            <a:extLst>
-              <a:ext uri="{FF2B5EF4-FFF2-40B4-BE49-F238E27FC236}">
-                <a16:creationId xmlns:a16="http://schemas.microsoft.com/office/drawing/2014/main" id="{88C88605-721D-4302-8B85-B28D8F5F7865}"/>
-              </a:ext>
-            </a:extLst>
-          </p:cNvPr>
-          <p:cNvSpPr>
-            <a:spLocks noGrp="1"/>
-          </p:cNvSpPr>
-          <p:nvPr>
-            <p:ph idx="1"/>
-          </p:nvPr>
-        </p:nvSpPr>
-        <p:spPr>
-          <a:xfrm>
-            <a:off x="6090574" y="801866"/>
-            <a:ext cx="5306084" cy="5230634"/>
-          </a:xfrm>
-        </p:spPr>
-        <p:txBody>
-          <a:bodyPr vert="horz" lIns="91440" tIns="45720" rIns="91440" bIns="45720" rtlCol="0" anchor="ctr">
-            <a:normAutofit/>
-          </a:bodyPr>
-          <a:lstStyle/>
-          <a:p>
-            <a:endParaRPr lang="en-US" sz="2400">
-              <a:solidFill>
-                <a:srgbClr val="000000"/>
-              </a:solidFill>
-              <a:cs typeface="Calibri"/>
-            </a:endParaRPr>
-          </a:p>
-          <a:p>
-            <a:endParaRPr lang="en-US" sz="2400">
-              <a:solidFill>
-                <a:srgbClr val="000000"/>
-              </a:solidFill>
-              <a:cs typeface="Calibri"/>
-            </a:endParaRPr>
-          </a:p>
-        </p:txBody>
-      </p:sp>
-      <p:sp>
-        <p:nvSpPr>
-          <p:cNvPr id="4" name="TextBox 3">
-            <a:extLst>
-              <a:ext uri="{FF2B5EF4-FFF2-40B4-BE49-F238E27FC236}">
-                <a16:creationId xmlns:a16="http://schemas.microsoft.com/office/drawing/2014/main" id="{8F909BA2-FE37-45C1-917B-DD136319F48F}"/>
-              </a:ext>
-            </a:extLst>
-          </p:cNvPr>
-          <p:cNvSpPr txBox="1"/>
-          <p:nvPr/>
-        </p:nvSpPr>
-        <p:spPr>
-          <a:xfrm>
-            <a:off x="6088541" y="2223476"/>
-            <a:ext cx="5294744" cy="4339650"/>
-          </a:xfrm>
-          <a:prstGeom prst="rect">
-            <a:avLst/>
-          </a:prstGeom>
-          <a:noFill/>
-        </p:spPr>
-        <p:txBody>
-          <a:bodyPr rot="0" spcFirstLastPara="0" vertOverflow="overflow" horzOverflow="overflow" vert="horz" wrap="square" lIns="91440" tIns="45720" rIns="91440" bIns="45720" numCol="1" spcCol="0" rtlCol="0" fromWordArt="0" anchor="t" anchorCtr="0" forceAA="0" compatLnSpc="1">
-            <a:prstTxWarp prst="textNoShape">
-              <a:avLst/>
-            </a:prstTxWarp>
-            <a:spAutoFit/>
-          </a:bodyPr>
-          <a:lstStyle/>
-          <a:p>
-            <a:pPr marL="285750" indent="-285750">
-              <a:buFont typeface="Arial"/>
-              <a:buChar char="•"/>
-            </a:pPr>
-            <a:r>
-              <a:rPr lang="en-US" sz="2400" dirty="0">
-                <a:cs typeface="Calibri"/>
-              </a:rPr>
-              <a:t>In fill color function we are calling flood fill function many time by giving the coordinates to fill all the shapes with the given color</a:t>
-            </a:r>
-          </a:p>
-          <a:p>
-            <a:endParaRPr lang="en-US" sz="2400">
-              <a:cs typeface="Calibri"/>
-            </a:endParaRPr>
-          </a:p>
-          <a:p>
-            <a:pPr marL="285750" indent="-285750">
-              <a:buFont typeface="Arial"/>
-              <a:buChar char="•"/>
-            </a:pPr>
-            <a:r>
-              <a:rPr lang="en-US" sz="2400" dirty="0">
-                <a:cs typeface="Calibri"/>
-              </a:rPr>
-              <a:t>And also to fill those 2 horizontal and 2 vertical path, we have called fill horizontal and vertical functions</a:t>
-            </a:r>
-          </a:p>
-          <a:p>
-            <a:endParaRPr lang="en-US" sz="2400">
-              <a:cs typeface="Calibri"/>
-            </a:endParaRPr>
-          </a:p>
-          <a:p>
-            <a:pPr>
-              <a:buFont typeface="Arial"/>
-            </a:pPr>
-            <a:endParaRPr lang="en-US" sz="2400">
-              <a:cs typeface="Calibri"/>
-            </a:endParaRPr>
-          </a:p>
-          <a:p>
-            <a:endParaRPr lang="en-US">
-              <a:cs typeface="Calibri"/>
-            </a:endParaRPr>
-          </a:p>
-          <a:p>
-            <a:endParaRPr lang="en-US">
-              <a:cs typeface="Calibri"/>
-            </a:endParaRPr>
-          </a:p>
-        </p:txBody>
-      </p:sp>
-    </p:spTree>
-    <p:extLst>
-      <p:ext uri="{BB962C8B-B14F-4D97-AF65-F5344CB8AC3E}">
-        <p14:creationId xmlns:p14="http://schemas.microsoft.com/office/powerpoint/2010/main" val="1971830792"/>
-      </p:ext>
-    </p:extLst>
-  </p:cSld>
-  <p:clrMapOvr>
-    <a:masterClrMapping/>
-  </p:clrMapOvr>
+  <p:timing>
+    <p:tnLst>
+      <p:par>
+        <p:cTn id="1" dur="indefinite" restart="never" nodeType="tmRoot">
+          <p:childTnLst>
+            <p:seq concurrent="1" nextAc="seek">
+              <p:cTn id="2" dur="indefinite" nodeType="mainSeq">
+                <p:childTnLst>
+                  <p:par>
+                    <p:cTn id="3" fill="hold">
+                      <p:stCondLst>
+                        <p:cond delay="indefinite"/>
+                        <p:cond evt="onBegin" delay="0">
+                          <p:tn val="2"/>
+                        </p:cond>
+                      </p:stCondLst>
+                      <p:childTnLst>
+                        <p:par>
+                          <p:cTn id="4" fill="hold">
+                            <p:stCondLst>
+                              <p:cond delay="0"/>
+                            </p:stCondLst>
+                            <p:childTnLst>
+                              <p:par>
+                                <p:cTn id="5" presetID="10" presetClass="entr" presetSubtype="0" fill="hold" grpId="0" nodeType="withEffect">
+                                  <p:stCondLst>
+                                    <p:cond delay="500"/>
+                                  </p:stCondLst>
+                                  <p:iterate type="lt">
+                                    <p:tmPct val="10000"/>
+                                  </p:iterate>
+                                  <p:childTnLst>
+                                    <p:set>
+                                      <p:cBhvr>
+                                        <p:cTn id="6" dur="1" fill="hold">
+                                          <p:stCondLst>
+                                            <p:cond delay="0"/>
+                                          </p:stCondLst>
+                                        </p:cTn>
+                                        <p:tgtEl>
+                                          <p:spTgt spid="2"/>
+                                        </p:tgtEl>
+                                        <p:attrNameLst>
+                                          <p:attrName>style.visibility</p:attrName>
+                                        </p:attrNameLst>
+                                      </p:cBhvr>
+                                      <p:to>
+                                        <p:strVal val="visible"/>
+                                      </p:to>
+                                    </p:set>
+                                    <p:animEffect transition="in" filter="fade">
+                                      <p:cBhvr>
+                                        <p:cTn id="7" dur="400"/>
+                                        <p:tgtEl>
+                                          <p:spTgt spid="2"/>
+                                        </p:tgtEl>
+                                      </p:cBhvr>
+                                    </p:animEffect>
+                                  </p:childTnLst>
+                                </p:cTn>
+                              </p:par>
+                            </p:childTnLst>
+                          </p:cTn>
+                        </p:par>
+                      </p:childTnLst>
+                    </p:cTn>
+                  </p:par>
+                </p:childTnLst>
+              </p:cTn>
+              <p:prevCondLst>
+                <p:cond evt="onPrev" delay="0">
+                  <p:tgtEl>
+                    <p:sldTgt/>
+                  </p:tgtEl>
+                </p:cond>
+              </p:prevCondLst>
+              <p:nextCondLst>
+                <p:cond evt="onNext" delay="0">
+                  <p:tgtEl>
+                    <p:sldTgt/>
+                  </p:tgtEl>
+                </p:cond>
+              </p:nextCondLst>
+            </p:seq>
+          </p:childTnLst>
+        </p:cTn>
+      </p:par>
+    </p:tnLst>
+    <p:bldLst>
+      <p:bldP spid="2" grpId="0"/>
+    </p:bldLst>
+  </p:timing>
 </p:sld>
 </file>
 

</xml_diff>